<commit_message>
seperated apps into different chalice apps
</commit_message>
<xml_diff>
--- a/ACME-voting_diagrams_white.pptx
+++ b/ACME-voting_diagrams_white.pptx
@@ -5,12 +5,13 @@
     <p:sldMasterId id="2147483648" r:id="rId1"/>
   </p:sldMasterIdLst>
   <p:notesMasterIdLst>
-    <p:notesMasterId r:id="rId5"/>
+    <p:notesMasterId r:id="rId6"/>
   </p:notesMasterIdLst>
   <p:sldIdLst>
     <p:sldId id="315" r:id="rId2"/>
     <p:sldId id="317" r:id="rId3"/>
-    <p:sldId id="324" r:id="rId4"/>
+    <p:sldId id="325" r:id="rId4"/>
+    <p:sldId id="324" r:id="rId5"/>
   </p:sldIdLst>
   <p:sldSz cx="12192000" cy="6858000"/>
   <p:notesSz cx="6858000" cy="9144000"/>
@@ -300,7 +301,7 @@
           <a:p>
             <a:fld id="{E11015C8-0C37-4332-94A7-84CB7AA853A5}" type="datetimeFigureOut">
               <a:rPr lang="en-US" smtClean="0"/>
-              <a:t>8/22/17</a:t>
+              <a:t>9/1/17</a:t>
             </a:fld>
             <a:endParaRPr lang="en-US"/>
           </a:p>
@@ -1289,15 +1290,7 @@
           <a:bodyPr/>
           <a:lstStyle/>
           <a:p>
-            <a:r>
-              <a:rPr lang="en-US" b="1" dirty="0" smtClean="0"/>
-              <a:t>[END ON NEXT</a:t>
-            </a:r>
-            <a:r>
-              <a:rPr lang="en-US" b="1" baseline="0" dirty="0" smtClean="0"/>
-              <a:t> STEPS]</a:t>
-            </a:r>
-            <a:endParaRPr lang="en-US" b="1" dirty="0"/>
+            <a:endParaRPr lang="en-US" dirty="0"/>
           </a:p>
         </p:txBody>
       </p:sp>
@@ -1316,9 +1309,101 @@
           <a:bodyPr/>
           <a:lstStyle/>
           <a:p>
+            <a:fld id="{66F73B6F-6C74-6846-B3E2-267958B98325}" type="slidenum">
+              <a:rPr lang="en-US" smtClean="0"/>
+              <a:t>3</a:t>
+            </a:fld>
+            <a:endParaRPr lang="en-US"/>
+          </a:p>
+        </p:txBody>
+      </p:sp>
+    </p:spTree>
+    <p:extLst>
+      <p:ext uri="{BB962C8B-B14F-4D97-AF65-F5344CB8AC3E}">
+        <p14:creationId xmlns:p14="http://schemas.microsoft.com/office/powerpoint/2010/main" val="180467273"/>
+      </p:ext>
+    </p:extLst>
+  </p:cSld>
+  <p:clrMapOvr>
+    <a:masterClrMapping/>
+  </p:clrMapOvr>
+</p:notes>
+</file>
+
+<file path=ppt/notesSlides/notesSlide4.xml><?xml version="1.0" encoding="utf-8"?>
+<p:notes xmlns:a="http://schemas.openxmlformats.org/drawingml/2006/main" xmlns:r="http://schemas.openxmlformats.org/officeDocument/2006/relationships" xmlns:p="http://schemas.openxmlformats.org/presentationml/2006/main">
+  <p:cSld>
+    <p:spTree>
+      <p:nvGrpSpPr>
+        <p:cNvPr id="1" name=""/>
+        <p:cNvGrpSpPr/>
+        <p:nvPr/>
+      </p:nvGrpSpPr>
+      <p:grpSpPr>
+        <a:xfrm>
+          <a:off x="0" y="0"/>
+          <a:ext cx="0" cy="0"/>
+          <a:chOff x="0" y="0"/>
+          <a:chExt cx="0" cy="0"/>
+        </a:xfrm>
+      </p:grpSpPr>
+      <p:sp>
+        <p:nvSpPr>
+          <p:cNvPr id="2" name="Slide Image Placeholder 1"/>
+          <p:cNvSpPr>
+            <a:spLocks noGrp="1" noRot="1" noChangeAspect="1"/>
+          </p:cNvSpPr>
+          <p:nvPr>
+            <p:ph type="sldImg"/>
+          </p:nvPr>
+        </p:nvSpPr>
+        <p:spPr/>
+      </p:sp>
+      <p:sp>
+        <p:nvSpPr>
+          <p:cNvPr id="3" name="Notes Placeholder 2"/>
+          <p:cNvSpPr>
+            <a:spLocks noGrp="1"/>
+          </p:cNvSpPr>
+          <p:nvPr>
+            <p:ph type="body" idx="1"/>
+          </p:nvPr>
+        </p:nvSpPr>
+        <p:spPr/>
+        <p:txBody>
+          <a:bodyPr/>
+          <a:lstStyle/>
+          <a:p>
+            <a:r>
+              <a:rPr lang="en-US" b="1" dirty="0" smtClean="0"/>
+              <a:t>[END ON NEXT</a:t>
+            </a:r>
+            <a:r>
+              <a:rPr lang="en-US" b="1" baseline="0" dirty="0" smtClean="0"/>
+              <a:t> STEPS]</a:t>
+            </a:r>
+            <a:endParaRPr lang="en-US" b="1" dirty="0"/>
+          </a:p>
+        </p:txBody>
+      </p:sp>
+      <p:sp>
+        <p:nvSpPr>
+          <p:cNvPr id="4" name="Slide Number Placeholder 3"/>
+          <p:cNvSpPr>
+            <a:spLocks noGrp="1"/>
+          </p:cNvSpPr>
+          <p:nvPr>
+            <p:ph type="sldNum" sz="quarter" idx="10"/>
+          </p:nvPr>
+        </p:nvSpPr>
+        <p:spPr/>
+        <p:txBody>
+          <a:bodyPr/>
+          <a:lstStyle/>
+          <a:p>
             <a:fld id="{E84F3568-9D96-4F57-980F-57E381E20067}" type="slidenum">
               <a:rPr lang="en-US" smtClean="0"/>
-              <a:t>3</a:t>
+              <a:t>4</a:t>
             </a:fld>
             <a:endParaRPr lang="en-US"/>
           </a:p>
@@ -1468,7 +1553,7 @@
           <a:p>
             <a:fld id="{9DD0D7DD-CF67-46AE-9F6B-9A44CD5AAD80}" type="datetimeFigureOut">
               <a:rPr lang="en-US" smtClean="0"/>
-              <a:t>8/22/17</a:t>
+              <a:t>9/1/17</a:t>
             </a:fld>
             <a:endParaRPr lang="en-US"/>
           </a:p>
@@ -1638,7 +1723,7 @@
           <a:p>
             <a:fld id="{9DD0D7DD-CF67-46AE-9F6B-9A44CD5AAD80}" type="datetimeFigureOut">
               <a:rPr lang="en-US" smtClean="0"/>
-              <a:t>8/22/17</a:t>
+              <a:t>9/1/17</a:t>
             </a:fld>
             <a:endParaRPr lang="en-US"/>
           </a:p>
@@ -1818,7 +1903,7 @@
           <a:p>
             <a:fld id="{9DD0D7DD-CF67-46AE-9F6B-9A44CD5AAD80}" type="datetimeFigureOut">
               <a:rPr lang="en-US" smtClean="0"/>
-              <a:t>8/22/17</a:t>
+              <a:t>9/1/17</a:t>
             </a:fld>
             <a:endParaRPr lang="en-US"/>
           </a:p>
@@ -2295,7 +2380,7 @@
           <a:p>
             <a:fld id="{9DD0D7DD-CF67-46AE-9F6B-9A44CD5AAD80}" type="datetimeFigureOut">
               <a:rPr lang="en-US" smtClean="0"/>
-              <a:t>8/22/17</a:t>
+              <a:t>9/1/17</a:t>
             </a:fld>
             <a:endParaRPr lang="en-US"/>
           </a:p>
@@ -2541,7 +2626,7 @@
           <a:p>
             <a:fld id="{9DD0D7DD-CF67-46AE-9F6B-9A44CD5AAD80}" type="datetimeFigureOut">
               <a:rPr lang="en-US" smtClean="0"/>
-              <a:t>8/22/17</a:t>
+              <a:t>9/1/17</a:t>
             </a:fld>
             <a:endParaRPr lang="en-US"/>
           </a:p>
@@ -2773,7 +2858,7 @@
           <a:p>
             <a:fld id="{9DD0D7DD-CF67-46AE-9F6B-9A44CD5AAD80}" type="datetimeFigureOut">
               <a:rPr lang="en-US" smtClean="0"/>
-              <a:t>8/22/17</a:t>
+              <a:t>9/1/17</a:t>
             </a:fld>
             <a:endParaRPr lang="en-US"/>
           </a:p>
@@ -3140,7 +3225,7 @@
           <a:p>
             <a:fld id="{9DD0D7DD-CF67-46AE-9F6B-9A44CD5AAD80}" type="datetimeFigureOut">
               <a:rPr lang="en-US" smtClean="0"/>
-              <a:t>8/22/17</a:t>
+              <a:t>9/1/17</a:t>
             </a:fld>
             <a:endParaRPr lang="en-US"/>
           </a:p>
@@ -3258,7 +3343,7 @@
           <a:p>
             <a:fld id="{9DD0D7DD-CF67-46AE-9F6B-9A44CD5AAD80}" type="datetimeFigureOut">
               <a:rPr lang="en-US" smtClean="0"/>
-              <a:t>8/22/17</a:t>
+              <a:t>9/1/17</a:t>
             </a:fld>
             <a:endParaRPr lang="en-US"/>
           </a:p>
@@ -3353,7 +3438,7 @@
           <a:p>
             <a:fld id="{9DD0D7DD-CF67-46AE-9F6B-9A44CD5AAD80}" type="datetimeFigureOut">
               <a:rPr lang="en-US" smtClean="0"/>
-              <a:t>8/22/17</a:t>
+              <a:t>9/1/17</a:t>
             </a:fld>
             <a:endParaRPr lang="en-US"/>
           </a:p>
@@ -3630,7 +3715,7 @@
           <a:p>
             <a:fld id="{9DD0D7DD-CF67-46AE-9F6B-9A44CD5AAD80}" type="datetimeFigureOut">
               <a:rPr lang="en-US" smtClean="0"/>
-              <a:t>8/22/17</a:t>
+              <a:t>9/1/17</a:t>
             </a:fld>
             <a:endParaRPr lang="en-US"/>
           </a:p>
@@ -3883,7 +3968,7 @@
           <a:p>
             <a:fld id="{9DD0D7DD-CF67-46AE-9F6B-9A44CD5AAD80}" type="datetimeFigureOut">
               <a:rPr lang="en-US" smtClean="0"/>
-              <a:t>8/22/17</a:t>
+              <a:t>9/1/17</a:t>
             </a:fld>
             <a:endParaRPr lang="en-US"/>
           </a:p>
@@ -4096,7 +4181,7 @@
           <a:p>
             <a:fld id="{9DD0D7DD-CF67-46AE-9F6B-9A44CD5AAD80}" type="datetimeFigureOut">
               <a:rPr lang="en-US" smtClean="0"/>
-              <a:t>8/22/17</a:t>
+              <a:t>9/1/17</a:t>
             </a:fld>
             <a:endParaRPr lang="en-US"/>
           </a:p>
@@ -4696,7 +4781,7 @@
                   <a:schemeClr val="tx1"/>
                 </a:solidFill>
               </a:rPr>
-              <a:t>Basic architecture</a:t>
+              <a:t>Application architecture</a:t>
             </a:r>
             <a:endParaRPr lang="en-US" dirty="0">
               <a:solidFill>
@@ -4758,7 +4843,7 @@
         </p:blipFill>
         <p:spPr>
           <a:xfrm>
-            <a:off x="4704911" y="1300676"/>
+            <a:off x="4823442" y="1300676"/>
             <a:ext cx="792865" cy="890080"/>
           </a:xfrm>
           <a:prstGeom prst="rect">
@@ -4774,7 +4859,7 @@
         </p:nvSpPr>
         <p:spPr>
           <a:xfrm>
-            <a:off x="4623438" y="1147014"/>
+            <a:off x="4741596" y="1147630"/>
             <a:ext cx="977031" cy="221413"/>
           </a:xfrm>
           <a:prstGeom prst="rect">
@@ -4813,7 +4898,7 @@
         </p:nvSpPr>
         <p:spPr>
           <a:xfrm>
-            <a:off x="6958746" y="6385452"/>
+            <a:off x="8535885" y="6470117"/>
             <a:ext cx="803434" cy="154042"/>
           </a:xfrm>
           <a:prstGeom prst="rect">
@@ -4858,7 +4943,7 @@
         </p:blipFill>
         <p:spPr>
           <a:xfrm>
-            <a:off x="9700022" y="1323386"/>
+            <a:off x="11156281" y="1323386"/>
             <a:ext cx="763634" cy="884953"/>
           </a:xfrm>
           <a:prstGeom prst="rect">
@@ -4874,7 +4959,7 @@
         </p:nvSpPr>
         <p:spPr>
           <a:xfrm>
-            <a:off x="9674452" y="2182685"/>
+            <a:off x="11130711" y="2182685"/>
             <a:ext cx="931699" cy="153968"/>
           </a:xfrm>
           <a:prstGeom prst="rect">
@@ -4915,7 +5000,7 @@
         <p:spPr>
           <a:xfrm>
             <a:off x="1188709" y="1737172"/>
-            <a:ext cx="3516202" cy="8544"/>
+            <a:ext cx="3634733" cy="8544"/>
           </a:xfrm>
           <a:prstGeom prst="straightConnector1">
             <a:avLst/>
@@ -4947,10 +5032,10 @@
         </p:nvGrpSpPr>
         <p:grpSpPr>
           <a:xfrm>
-            <a:off x="4707094" y="2741484"/>
-            <a:ext cx="789982" cy="1054512"/>
-            <a:chOff x="5957793" y="2217749"/>
-            <a:chExt cx="789982" cy="1054512"/>
+            <a:off x="4706593" y="3944497"/>
+            <a:ext cx="1047038" cy="1343087"/>
+            <a:chOff x="5957793" y="1929174"/>
+            <a:chExt cx="1047038" cy="1343087"/>
           </a:xfrm>
         </p:grpSpPr>
         <p:pic>
@@ -4975,8 +5060,8 @@
           </p:blipFill>
           <p:spPr>
             <a:xfrm>
-              <a:off x="5957793" y="2217749"/>
-              <a:ext cx="789982" cy="886846"/>
+              <a:off x="5957793" y="1929174"/>
+              <a:ext cx="1047038" cy="1175421"/>
             </a:xfrm>
             <a:prstGeom prst="rect">
               <a:avLst/>
@@ -4991,7 +5076,7 @@
           </p:nvSpPr>
           <p:spPr>
             <a:xfrm>
-              <a:off x="5987024" y="3116629"/>
+              <a:off x="6127704" y="3116629"/>
               <a:ext cx="731520" cy="155632"/>
             </a:xfrm>
             <a:prstGeom prst="rect">
@@ -5023,14 +5108,15 @@
         <p:nvCxnSpPr>
           <p:cNvPr id="52" name="Straight Arrow Connector 51"/>
           <p:cNvCxnSpPr>
+            <a:stCxn id="33" idx="2"/>
             <a:endCxn id="49" idx="0"/>
           </p:cNvCxnSpPr>
           <p:nvPr/>
         </p:nvCxnSpPr>
         <p:spPr>
           <a:xfrm>
-            <a:off x="5096821" y="2202790"/>
-            <a:ext cx="5264" cy="538694"/>
+            <a:off x="5219875" y="2190756"/>
+            <a:ext cx="10237" cy="1753741"/>
           </a:xfrm>
           <a:prstGeom prst="straightConnector1">
             <a:avLst/>
@@ -5076,7 +5162,7 @@
         </p:blipFill>
         <p:spPr>
           <a:xfrm>
-            <a:off x="4722477" y="5657045"/>
+            <a:off x="4877577" y="5661080"/>
             <a:ext cx="766873" cy="886846"/>
           </a:xfrm>
           <a:prstGeom prst="rect">
@@ -5092,7 +5178,7 @@
         </p:nvSpPr>
         <p:spPr>
           <a:xfrm>
-            <a:off x="4889108" y="6509309"/>
+            <a:off x="4821376" y="6509309"/>
             <a:ext cx="894752" cy="155632"/>
           </a:xfrm>
           <a:prstGeom prst="rect">
@@ -5106,6 +5192,7 @@
           </a:bodyPr>
           <a:lstStyle/>
           <a:p>
+            <a:pPr algn="ctr"/>
             <a:r>
               <a:rPr lang="en-US" sz="1000" b="1" dirty="0" smtClean="0"/>
               <a:t>Amazon</a:t>
@@ -5143,7 +5230,7 @@
         </p:blipFill>
         <p:spPr>
           <a:xfrm>
-            <a:off x="4714661" y="4242478"/>
+            <a:off x="6323318" y="4411808"/>
             <a:ext cx="795835" cy="886846"/>
           </a:xfrm>
           <a:prstGeom prst="rect">
@@ -5159,7 +5246,7 @@
         </p:nvSpPr>
         <p:spPr>
           <a:xfrm>
-            <a:off x="4639063" y="5120688"/>
+            <a:off x="6292193" y="5322983"/>
             <a:ext cx="894752" cy="155632"/>
           </a:xfrm>
           <a:prstGeom prst="rect">
@@ -5192,8 +5279,8 @@
         </p:nvCxnSpPr>
         <p:spPr>
           <a:xfrm>
-            <a:off x="5547272" y="2025550"/>
-            <a:ext cx="1417576" cy="1141227"/>
+            <a:off x="5687951" y="2019708"/>
+            <a:ext cx="2873835" cy="1147069"/>
           </a:xfrm>
           <a:prstGeom prst="straightConnector1">
             <a:avLst/>
@@ -5344,7 +5431,7 @@
         </p:blipFill>
         <p:spPr>
           <a:xfrm>
-            <a:off x="6973122" y="5499545"/>
+            <a:off x="8550261" y="5584210"/>
             <a:ext cx="769853" cy="833643"/>
           </a:xfrm>
           <a:prstGeom prst="rect">
@@ -5362,7 +5449,7 @@
         </p:nvCxnSpPr>
         <p:spPr>
           <a:xfrm flipH="1" flipV="1">
-            <a:off x="5510496" y="4927333"/>
+            <a:off x="7087635" y="5011998"/>
             <a:ext cx="1462626" cy="989034"/>
           </a:xfrm>
           <a:prstGeom prst="straightConnector1">
@@ -5410,7 +5497,7 @@
         </p:blipFill>
         <p:spPr>
           <a:xfrm>
-            <a:off x="10741312" y="4701266"/>
+            <a:off x="11164639" y="4701266"/>
             <a:ext cx="817739" cy="905805"/>
           </a:xfrm>
           <a:prstGeom prst="rect">
@@ -5426,7 +5513,7 @@
         </p:nvSpPr>
         <p:spPr>
           <a:xfrm>
-            <a:off x="10702805" y="5608165"/>
+            <a:off x="11126132" y="5608165"/>
             <a:ext cx="894752" cy="155632"/>
           </a:xfrm>
           <a:prstGeom prst="rect">
@@ -5494,7 +5581,7 @@
         </p:nvSpPr>
         <p:spPr>
           <a:xfrm>
-            <a:off x="6965573" y="3576340"/>
+            <a:off x="8562511" y="3576340"/>
             <a:ext cx="798808" cy="147068"/>
           </a:xfrm>
           <a:prstGeom prst="rect">
@@ -5539,7 +5626,7 @@
         </p:blipFill>
         <p:spPr>
           <a:xfrm>
-            <a:off x="6964848" y="2749955"/>
+            <a:off x="8561786" y="2749955"/>
             <a:ext cx="769853" cy="833643"/>
           </a:xfrm>
           <a:prstGeom prst="rect">
@@ -5558,8 +5645,8 @@
         </p:nvCxnSpPr>
         <p:spPr>
           <a:xfrm flipH="1" flipV="1">
-            <a:off x="5497776" y="1745716"/>
-            <a:ext cx="4202246" cy="20147"/>
+            <a:off x="5616307" y="1745716"/>
+            <a:ext cx="5539974" cy="20147"/>
           </a:xfrm>
           <a:prstGeom prst="straightConnector1">
             <a:avLst/>
@@ -5592,7 +5679,7 @@
         </p:nvCxnSpPr>
         <p:spPr>
           <a:xfrm flipH="1">
-            <a:off x="7635618" y="2070478"/>
+            <a:off x="9091877" y="2070478"/>
             <a:ext cx="2148950" cy="763397"/>
           </a:xfrm>
           <a:prstGeom prst="straightConnector1">
@@ -5629,7 +5716,7 @@
         </p:nvSpPr>
         <p:spPr>
           <a:xfrm rot="20444859">
-            <a:off x="8767061" y="2102702"/>
+            <a:off x="10223320" y="2102702"/>
             <a:ext cx="752129" cy="400110"/>
           </a:xfrm>
           <a:prstGeom prst="rect">
@@ -5743,7 +5830,7 @@
         </p:nvSpPr>
         <p:spPr>
           <a:xfrm>
-            <a:off x="8965604" y="1560504"/>
+            <a:off x="10421863" y="1560504"/>
             <a:ext cx="708848" cy="400110"/>
           </a:xfrm>
           <a:prstGeom prst="rect">
@@ -5859,7 +5946,7 @@
         </p:nvGrpSpPr>
         <p:grpSpPr>
           <a:xfrm>
-            <a:off x="8124243" y="2218324"/>
+            <a:off x="9580502" y="2218324"/>
             <a:ext cx="1043415" cy="642002"/>
             <a:chOff x="5327758" y="4947288"/>
             <a:chExt cx="1391220" cy="856002"/>
@@ -5940,13 +6027,14 @@
           <p:cNvPr id="118" name="Straight Arrow Connector 117"/>
           <p:cNvCxnSpPr>
             <a:stCxn id="88" idx="3"/>
+            <a:endCxn id="79" idx="0"/>
           </p:cNvCxnSpPr>
           <p:nvPr/>
         </p:nvCxnSpPr>
         <p:spPr>
           <a:xfrm>
-            <a:off x="7734701" y="3166777"/>
-            <a:ext cx="3159408" cy="1579011"/>
+            <a:off x="9331639" y="3166777"/>
+            <a:ext cx="2241870" cy="1534489"/>
           </a:xfrm>
           <a:prstGeom prst="straightConnector1">
             <a:avLst/>
@@ -5977,8 +6065,8 @@
           <p:nvPr/>
         </p:nvSpPr>
         <p:spPr>
-          <a:xfrm rot="1625032">
-            <a:off x="10055710" y="4321057"/>
+          <a:xfrm rot="2002906">
+            <a:off x="10565251" y="4113745"/>
             <a:ext cx="790666" cy="400110"/>
           </a:xfrm>
           <a:prstGeom prst="rect">
@@ -6038,14 +6126,14 @@
         </p:nvCxnSpPr>
         <p:spPr>
           <a:xfrm flipH="1">
-            <a:off x="7742975" y="5421850"/>
-            <a:ext cx="3015127" cy="494517"/>
+            <a:off x="9320114" y="5473285"/>
+            <a:ext cx="1844525" cy="527747"/>
           </a:xfrm>
           <a:prstGeom prst="straightConnector1">
             <a:avLst/>
           </a:prstGeom>
           <a:ln w="38100">
-            <a:headEnd type="triangle" w="med" len="med"/>
+            <a:headEnd type="none" w="med" len="med"/>
             <a:tailEnd type="triangle" w="med" len="med"/>
           </a:ln>
         </p:spPr>
@@ -6075,8 +6163,8 @@
         </p:nvCxnSpPr>
         <p:spPr>
           <a:xfrm rot="10800000">
-            <a:off x="1265409" y="5204598"/>
-            <a:ext cx="3457068" cy="895871"/>
+            <a:off x="1265409" y="5204597"/>
+            <a:ext cx="3612168" cy="899906"/>
           </a:xfrm>
           <a:prstGeom prst="bentConnector2">
             <a:avLst/>
@@ -6139,8 +6227,8 @@
         </p:nvCxnSpPr>
         <p:spPr>
           <a:xfrm flipH="1">
-            <a:off x="3013676" y="3456880"/>
-            <a:ext cx="1672453" cy="832549"/>
+            <a:off x="3013677" y="4279481"/>
+            <a:ext cx="1733041" cy="9948"/>
           </a:xfrm>
           <a:prstGeom prst="straightConnector1">
             <a:avLst/>
@@ -6175,7 +6263,7 @@
         </p:nvCxnSpPr>
         <p:spPr>
           <a:xfrm flipH="1">
-            <a:off x="3088233" y="4934768"/>
+            <a:off x="3088233" y="5087165"/>
             <a:ext cx="1651454" cy="65"/>
           </a:xfrm>
           <a:prstGeom prst="straightConnector1">
@@ -6209,7 +6297,7 @@
         </p:nvSpPr>
         <p:spPr>
           <a:xfrm>
-            <a:off x="3943852" y="4734713"/>
+            <a:off x="3943852" y="4887110"/>
             <a:ext cx="795835" cy="400110"/>
           </a:xfrm>
           <a:prstGeom prst="rect">
@@ -6360,7 +6448,7 @@
         </p:blipFill>
         <p:spPr>
           <a:xfrm>
-            <a:off x="6982364" y="4105141"/>
+            <a:off x="8559503" y="4189806"/>
             <a:ext cx="769853" cy="833643"/>
           </a:xfrm>
           <a:prstGeom prst="rect">
@@ -6376,7 +6464,7 @@
         </p:nvSpPr>
         <p:spPr>
           <a:xfrm>
-            <a:off x="6965573" y="4914027"/>
+            <a:off x="8542712" y="4998692"/>
             <a:ext cx="803434" cy="154042"/>
           </a:xfrm>
           <a:prstGeom prst="rect">
@@ -6406,8 +6494,8 @@
           <p:nvPr/>
         </p:nvSpPr>
         <p:spPr>
-          <a:xfrm rot="19995881">
-            <a:off x="2985123" y="3812925"/>
+          <a:xfrm>
+            <a:off x="3035446" y="4100587"/>
             <a:ext cx="1150054" cy="400110"/>
           </a:xfrm>
           <a:prstGeom prst="rect">
@@ -6463,7 +6551,7 @@
         </p:nvSpPr>
         <p:spPr>
           <a:xfrm rot="2174975">
-            <a:off x="5479086" y="4989560"/>
+            <a:off x="7070809" y="5074225"/>
             <a:ext cx="795835" cy="400110"/>
           </a:xfrm>
           <a:prstGeom prst="rect">
@@ -6521,14 +6609,15 @@
         </p:nvCxnSpPr>
         <p:spPr>
           <a:xfrm flipH="1" flipV="1">
-            <a:off x="5484235" y="4521962"/>
+            <a:off x="7061374" y="4606627"/>
             <a:ext cx="1498129" cy="1"/>
           </a:xfrm>
           <a:prstGeom prst="straightConnector1">
             <a:avLst/>
           </a:prstGeom>
           <a:ln w="38100">
-            <a:tailEnd type="triangle"/>
+            <a:headEnd type="triangle" w="med" len="med"/>
+            <a:tailEnd type="triangle" w="med" len="med"/>
           </a:ln>
         </p:spPr>
         <p:style>
@@ -6554,7 +6643,7 @@
         </p:nvCxnSpPr>
         <p:spPr>
           <a:xfrm flipH="1">
-            <a:off x="3073720" y="4513855"/>
+            <a:off x="3073720" y="4666252"/>
             <a:ext cx="1651454" cy="65"/>
           </a:xfrm>
           <a:prstGeom prst="straightConnector1">
@@ -6588,7 +6677,7 @@
         </p:nvSpPr>
         <p:spPr>
           <a:xfrm>
-            <a:off x="3929339" y="4313800"/>
+            <a:off x="3929339" y="4466197"/>
             <a:ext cx="795835" cy="400110"/>
           </a:xfrm>
           <a:prstGeom prst="rect">
@@ -6646,7 +6735,7 @@
         </p:nvSpPr>
         <p:spPr>
           <a:xfrm>
-            <a:off x="3100727" y="4313800"/>
+            <a:off x="3100727" y="4466197"/>
             <a:ext cx="795835" cy="400110"/>
           </a:xfrm>
           <a:prstGeom prst="rect">
@@ -6704,8 +6793,8 @@
         </p:nvCxnSpPr>
         <p:spPr>
           <a:xfrm flipH="1" flipV="1">
-            <a:off x="7752217" y="4521963"/>
-            <a:ext cx="2971579" cy="469085"/>
+            <a:off x="9329356" y="4606628"/>
+            <a:ext cx="1818493" cy="295035"/>
           </a:xfrm>
           <a:prstGeom prst="straightConnector1">
             <a:avLst/>
@@ -6738,7 +6827,7 @@
         </p:nvSpPr>
         <p:spPr>
           <a:xfrm rot="538168">
-            <a:off x="8848011" y="4545733"/>
+            <a:off x="9968674" y="4560525"/>
             <a:ext cx="590226" cy="400110"/>
           </a:xfrm>
           <a:prstGeom prst="rect">
@@ -6796,7 +6885,7 @@
         </p:nvSpPr>
         <p:spPr>
           <a:xfrm>
-            <a:off x="3122477" y="4734713"/>
+            <a:off x="3122477" y="4887110"/>
             <a:ext cx="795835" cy="400110"/>
           </a:xfrm>
           <a:prstGeom prst="rect">
@@ -6852,7 +6941,7 @@
         </p:nvSpPr>
         <p:spPr>
           <a:xfrm>
-            <a:off x="6272538" y="4328085"/>
+            <a:off x="7717867" y="4418088"/>
             <a:ext cx="795835" cy="400110"/>
           </a:xfrm>
           <a:prstGeom prst="rect">
@@ -6910,7 +6999,7 @@
         </p:nvSpPr>
         <p:spPr>
           <a:xfrm>
-            <a:off x="5525009" y="4336310"/>
+            <a:off x="7116732" y="4420975"/>
             <a:ext cx="795835" cy="400110"/>
           </a:xfrm>
           <a:prstGeom prst="rect">
@@ -6952,7 +7041,7 @@
         </p:nvSpPr>
         <p:spPr>
           <a:xfrm rot="2146497">
-            <a:off x="6222507" y="5471197"/>
+            <a:off x="7644900" y="5555862"/>
             <a:ext cx="795835" cy="400110"/>
           </a:xfrm>
           <a:prstGeom prst="rect">
@@ -7163,6 +7252,98 @@
             <a:solidFill>
               <a:schemeClr val="accent1"/>
             </a:solidFill>
+            <a:headEnd type="triangle" w="med" len="med"/>
+            <a:tailEnd type="triangle" w="med" len="med"/>
+          </a:ln>
+        </p:spPr>
+        <p:style>
+          <a:lnRef idx="1">
+            <a:schemeClr val="accent1"/>
+          </a:lnRef>
+          <a:fillRef idx="0">
+            <a:schemeClr val="accent1"/>
+          </a:fillRef>
+          <a:effectRef idx="0">
+            <a:schemeClr val="accent1"/>
+          </a:effectRef>
+          <a:fontRef idx="minor">
+            <a:schemeClr val="tx1"/>
+          </a:fontRef>
+        </p:style>
+      </p:cxnSp>
+      <p:sp>
+        <p:nvSpPr>
+          <p:cNvPr id="227" name="TextBox 226"/>
+          <p:cNvSpPr txBox="1"/>
+          <p:nvPr/>
+        </p:nvSpPr>
+        <p:spPr>
+          <a:xfrm rot="20509655">
+            <a:off x="9412608" y="5677625"/>
+            <a:ext cx="790666" cy="400110"/>
+          </a:xfrm>
+          <a:prstGeom prst="rect">
+            <a:avLst/>
+          </a:prstGeom>
+          <a:noFill/>
+          <a:effectLst>
+            <a:glow rad="304800">
+              <a:schemeClr val="bg1"/>
+            </a:glow>
+          </a:effectLst>
+        </p:spPr>
+        <p:txBody>
+          <a:bodyPr wrap="none" rtlCol="0">
+            <a:spAutoFit/>
+          </a:bodyPr>
+          <a:lstStyle/>
+          <a:p>
+            <a:r>
+              <a:rPr lang="en-US" sz="1000" dirty="0" smtClean="0">
+                <a:effectLst>
+                  <a:glow rad="76200">
+                    <a:schemeClr val="bg1">
+                      <a:alpha val="90000"/>
+                    </a:schemeClr>
+                  </a:glow>
+                </a:effectLst>
+              </a:rPr>
+              <a:t>Transcoded</a:t>
+            </a:r>
+          </a:p>
+          <a:p>
+            <a:r>
+              <a:rPr lang="en-US" sz="1000" dirty="0" smtClean="0">
+                <a:effectLst>
+                  <a:glow rad="76200">
+                    <a:schemeClr val="bg1">
+                      <a:alpha val="90000"/>
+                    </a:schemeClr>
+                  </a:glow>
+                </a:effectLst>
+              </a:rPr>
+              <a:t>Video info</a:t>
+            </a:r>
+          </a:p>
+        </p:txBody>
+      </p:sp>
+      <p:cxnSp>
+        <p:nvCxnSpPr>
+          <p:cNvPr id="236" name="Straight Arrow Connector 129"/>
+          <p:cNvCxnSpPr/>
+          <p:nvPr/>
+        </p:nvCxnSpPr>
+        <p:spPr>
+          <a:xfrm rot="10800000" flipV="1">
+            <a:off x="5616308" y="5079733"/>
+            <a:ext cx="665613" cy="2927"/>
+          </a:xfrm>
+          <a:prstGeom prst="bentConnector3">
+            <a:avLst>
+              <a:gd name="adj1" fmla="val 50000"/>
+            </a:avLst>
+          </a:prstGeom>
+          <a:ln w="38100">
             <a:headEnd type="triangle" w="med" len="med"/>
             <a:tailEnd type="triangle" w="med" len="med"/>
           </a:ln>
@@ -7184,20 +7365,23 @@
       </p:cxnSp>
       <p:cxnSp>
         <p:nvCxnSpPr>
-          <p:cNvPr id="222" name="Straight Arrow Connector 221"/>
+          <p:cNvPr id="239" name="Straight Arrow Connector 129"/>
           <p:cNvCxnSpPr/>
           <p:nvPr/>
         </p:nvCxnSpPr>
         <p:spPr>
-          <a:xfrm flipH="1" flipV="1">
-            <a:off x="5261431" y="2085131"/>
-            <a:ext cx="1782444" cy="2155051"/>
-          </a:xfrm>
-          <a:prstGeom prst="straightConnector1">
-            <a:avLst/>
+          <a:xfrm rot="10800000" flipV="1">
+            <a:off x="5856646" y="4646725"/>
+            <a:ext cx="477276" cy="3343"/>
+          </a:xfrm>
+          <a:prstGeom prst="bentConnector3">
+            <a:avLst>
+              <a:gd name="adj1" fmla="val 50000"/>
+            </a:avLst>
           </a:prstGeom>
           <a:ln w="38100">
-            <a:tailEnd type="triangle"/>
+            <a:headEnd type="triangle" w="med" len="med"/>
+            <a:tailEnd type="triangle" w="med" len="med"/>
           </a:ln>
         </p:spPr>
         <p:style>
@@ -7215,113 +7399,6 @@
           </a:fontRef>
         </p:style>
       </p:cxnSp>
-      <p:sp>
-        <p:nvSpPr>
-          <p:cNvPr id="226" name="TextBox 225"/>
-          <p:cNvSpPr txBox="1"/>
-          <p:nvPr/>
-        </p:nvSpPr>
-        <p:spPr>
-          <a:xfrm rot="2954987">
-            <a:off x="5167824" y="2294635"/>
-            <a:ext cx="941283" cy="246221"/>
-          </a:xfrm>
-          <a:prstGeom prst="rect">
-            <a:avLst/>
-          </a:prstGeom>
-          <a:noFill/>
-          <a:effectLst>
-            <a:glow rad="304800">
-              <a:schemeClr val="bg1"/>
-            </a:glow>
-          </a:effectLst>
-        </p:spPr>
-        <p:txBody>
-          <a:bodyPr wrap="none" rtlCol="0">
-            <a:spAutoFit/>
-          </a:bodyPr>
-          <a:lstStyle/>
-          <a:p>
-            <a:r>
-              <a:rPr lang="en-US" sz="1000" smtClean="0">
-                <a:effectLst>
-                  <a:glow rad="76200">
-                    <a:schemeClr val="bg1">
-                      <a:alpha val="90000"/>
-                    </a:schemeClr>
-                  </a:glow>
-                </a:effectLst>
-              </a:rPr>
-              <a:t>VoteTotal.json</a:t>
-            </a:r>
-            <a:endParaRPr lang="en-US" sz="1000" dirty="0" smtClean="0">
-              <a:effectLst>
-                <a:glow rad="76200">
-                  <a:schemeClr val="bg1">
-                    <a:alpha val="90000"/>
-                  </a:schemeClr>
-                </a:glow>
-              </a:effectLst>
-            </a:endParaRPr>
-          </a:p>
-        </p:txBody>
-      </p:sp>
-      <p:sp>
-        <p:nvSpPr>
-          <p:cNvPr id="227" name="TextBox 226"/>
-          <p:cNvSpPr txBox="1"/>
-          <p:nvPr/>
-        </p:nvSpPr>
-        <p:spPr>
-          <a:xfrm rot="21021559">
-            <a:off x="7795718" y="5655790"/>
-            <a:ext cx="790666" cy="400110"/>
-          </a:xfrm>
-          <a:prstGeom prst="rect">
-            <a:avLst/>
-          </a:prstGeom>
-          <a:noFill/>
-          <a:effectLst>
-            <a:glow rad="304800">
-              <a:schemeClr val="bg1"/>
-            </a:glow>
-          </a:effectLst>
-        </p:spPr>
-        <p:txBody>
-          <a:bodyPr wrap="none" rtlCol="0">
-            <a:spAutoFit/>
-          </a:bodyPr>
-          <a:lstStyle/>
-          <a:p>
-            <a:r>
-              <a:rPr lang="en-US" sz="1000" dirty="0" smtClean="0">
-                <a:effectLst>
-                  <a:glow rad="76200">
-                    <a:schemeClr val="bg1">
-                      <a:alpha val="90000"/>
-                    </a:schemeClr>
-                  </a:glow>
-                </a:effectLst>
-              </a:rPr>
-              <a:t>Transcoded</a:t>
-            </a:r>
-          </a:p>
-          <a:p>
-            <a:r>
-              <a:rPr lang="en-US" sz="1000" dirty="0" smtClean="0">
-                <a:effectLst>
-                  <a:glow rad="76200">
-                    <a:schemeClr val="bg1">
-                      <a:alpha val="90000"/>
-                    </a:schemeClr>
-                  </a:glow>
-                </a:effectLst>
-              </a:rPr>
-              <a:t>Video info</a:t>
-            </a:r>
-          </a:p>
-        </p:txBody>
-      </p:sp>
     </p:spTree>
     <p:extLst>
       <p:ext uri="{BB962C8B-B14F-4D97-AF65-F5344CB8AC3E}">
@@ -7422,6 +7499,2767 @@
 </file>
 
 <file path=ppt/slides/slide3.xml><?xml version="1.0" encoding="utf-8"?>
+<p:sld xmlns:a="http://schemas.openxmlformats.org/drawingml/2006/main" xmlns:r="http://schemas.openxmlformats.org/officeDocument/2006/relationships" xmlns:p="http://schemas.openxmlformats.org/presentationml/2006/main">
+  <p:cSld>
+    <p:spTree>
+      <p:nvGrpSpPr>
+        <p:cNvPr id="1" name=""/>
+        <p:cNvGrpSpPr/>
+        <p:nvPr/>
+      </p:nvGrpSpPr>
+      <p:grpSpPr>
+        <a:xfrm>
+          <a:off x="0" y="0"/>
+          <a:ext cx="0" cy="0"/>
+          <a:chOff x="0" y="0"/>
+          <a:chExt cx="0" cy="0"/>
+        </a:xfrm>
+      </p:grpSpPr>
+      <p:sp>
+        <p:nvSpPr>
+          <p:cNvPr id="2" name="Title 1"/>
+          <p:cNvSpPr>
+            <a:spLocks noGrp="1"/>
+          </p:cNvSpPr>
+          <p:nvPr>
+            <p:ph type="title"/>
+          </p:nvPr>
+        </p:nvSpPr>
+        <p:spPr>
+          <a:xfrm>
+            <a:off x="289472" y="133388"/>
+            <a:ext cx="10515600" cy="640080"/>
+          </a:xfrm>
+        </p:spPr>
+        <p:txBody>
+          <a:bodyPr>
+            <a:normAutofit fontScale="90000"/>
+          </a:bodyPr>
+          <a:lstStyle/>
+          <a:p>
+            <a:r>
+              <a:rPr lang="en-US" smtClean="0">
+                <a:solidFill>
+                  <a:schemeClr val="tx1"/>
+                </a:solidFill>
+              </a:rPr>
+              <a:t>High Level design</a:t>
+            </a:r>
+            <a:endParaRPr lang="en-US" dirty="0">
+              <a:solidFill>
+                <a:schemeClr val="tx1"/>
+              </a:solidFill>
+            </a:endParaRPr>
+          </a:p>
+        </p:txBody>
+      </p:sp>
+      <p:pic>
+        <p:nvPicPr>
+          <p:cNvPr id="9" name="Picture 8" descr="User.png"/>
+          <p:cNvPicPr>
+            <a:picLocks noChangeAspect="1"/>
+          </p:cNvPicPr>
+          <p:nvPr/>
+        </p:nvPicPr>
+        <p:blipFill>
+          <a:blip r:embed="rId3">
+            <a:extLst>
+              <a:ext uri="{28A0092B-C50C-407E-A947-70E740481C1C}">
+                <a14:useLocalDpi xmlns:a14="http://schemas.microsoft.com/office/drawing/2010/main" val="0"/>
+              </a:ext>
+            </a:extLst>
+          </a:blip>
+          <a:stretch>
+            <a:fillRect/>
+          </a:stretch>
+        </p:blipFill>
+        <p:spPr>
+          <a:xfrm>
+            <a:off x="288008" y="1286821"/>
+            <a:ext cx="900701" cy="900701"/>
+          </a:xfrm>
+          <a:prstGeom prst="rect">
+            <a:avLst/>
+          </a:prstGeom>
+        </p:spPr>
+      </p:pic>
+      <p:pic>
+        <p:nvPicPr>
+          <p:cNvPr id="33" name="Picture 32"/>
+          <p:cNvPicPr>
+            <a:picLocks noChangeAspect="1"/>
+          </p:cNvPicPr>
+          <p:nvPr/>
+        </p:nvPicPr>
+        <p:blipFill>
+          <a:blip r:embed="rId4">
+            <a:extLst>
+              <a:ext uri="{28A0092B-C50C-407E-A947-70E740481C1C}">
+                <a14:useLocalDpi xmlns:a14="http://schemas.microsoft.com/office/drawing/2010/main" val="0"/>
+              </a:ext>
+            </a:extLst>
+          </a:blip>
+          <a:stretch>
+            <a:fillRect/>
+          </a:stretch>
+        </p:blipFill>
+        <p:spPr>
+          <a:xfrm>
+            <a:off x="4823442" y="1300676"/>
+            <a:ext cx="792865" cy="890080"/>
+          </a:xfrm>
+          <a:prstGeom prst="rect">
+            <a:avLst/>
+          </a:prstGeom>
+        </p:spPr>
+      </p:pic>
+      <p:sp>
+        <p:nvSpPr>
+          <p:cNvPr id="34" name="TextBox 33"/>
+          <p:cNvSpPr txBox="1"/>
+          <p:nvPr/>
+        </p:nvSpPr>
+        <p:spPr>
+          <a:xfrm>
+            <a:off x="4741596" y="1147630"/>
+            <a:ext cx="977031" cy="221413"/>
+          </a:xfrm>
+          <a:prstGeom prst="rect">
+            <a:avLst/>
+          </a:prstGeom>
+          <a:noFill/>
+        </p:spPr>
+        <p:txBody>
+          <a:bodyPr wrap="square" lIns="0" tIns="0" rIns="0" bIns="0" rtlCol="0" anchor="t">
+            <a:noAutofit/>
+          </a:bodyPr>
+          <a:lstStyle/>
+          <a:p>
+            <a:pPr algn="ctr"/>
+            <a:r>
+              <a:rPr lang="en-US" sz="1050" b="1" smtClean="0"/>
+              <a:t>Amazon</a:t>
+            </a:r>
+            <a:r>
+              <a:rPr lang="en-US" sz="1050" b="1" dirty="0"/>
+              <a:t> </a:t>
+            </a:r>
+            <a:r>
+              <a:rPr lang="en-US" sz="1050" b="1" smtClean="0"/>
+              <a:t>S3</a:t>
+            </a:r>
+            <a:endParaRPr lang="en-US" sz="1050" b="1" dirty="0"/>
+          </a:p>
+        </p:txBody>
+      </p:sp>
+      <p:sp>
+        <p:nvSpPr>
+          <p:cNvPr id="37" name="TextBox 36"/>
+          <p:cNvSpPr txBox="1"/>
+          <p:nvPr/>
+        </p:nvSpPr>
+        <p:spPr>
+          <a:xfrm>
+            <a:off x="8381139" y="6470117"/>
+            <a:ext cx="803434" cy="154042"/>
+          </a:xfrm>
+          <a:prstGeom prst="rect">
+            <a:avLst/>
+          </a:prstGeom>
+          <a:noFill/>
+        </p:spPr>
+        <p:txBody>
+          <a:bodyPr wrap="square" lIns="0" tIns="0" rIns="0" bIns="0" rtlCol="0" anchor="t">
+            <a:noAutofit/>
+          </a:bodyPr>
+          <a:lstStyle/>
+          <a:p>
+            <a:pPr algn="ctr"/>
+            <a:r>
+              <a:rPr lang="en-US" sz="1050" b="1" dirty="0" err="1" smtClean="0"/>
+              <a:t>VODInfo</a:t>
+            </a:r>
+            <a:endParaRPr lang="en-US" sz="1050" b="1" dirty="0"/>
+          </a:p>
+        </p:txBody>
+      </p:sp>
+      <p:pic>
+        <p:nvPicPr>
+          <p:cNvPr id="39" name="Picture 38"/>
+          <p:cNvPicPr>
+            <a:picLocks noChangeAspect="1"/>
+          </p:cNvPicPr>
+          <p:nvPr/>
+        </p:nvPicPr>
+        <p:blipFill>
+          <a:blip r:embed="rId5">
+            <a:extLst>
+              <a:ext uri="{28A0092B-C50C-407E-A947-70E740481C1C}">
+                <a14:useLocalDpi xmlns:a14="http://schemas.microsoft.com/office/drawing/2010/main" val="0"/>
+              </a:ext>
+            </a:extLst>
+          </a:blip>
+          <a:stretch>
+            <a:fillRect/>
+          </a:stretch>
+        </p:blipFill>
+        <p:spPr>
+          <a:xfrm>
+            <a:off x="11156281" y="1323386"/>
+            <a:ext cx="763634" cy="884953"/>
+          </a:xfrm>
+          <a:prstGeom prst="rect">
+            <a:avLst/>
+          </a:prstGeom>
+        </p:spPr>
+      </p:pic>
+      <p:sp>
+        <p:nvSpPr>
+          <p:cNvPr id="40" name="TextBox 39"/>
+          <p:cNvSpPr txBox="1"/>
+          <p:nvPr/>
+        </p:nvSpPr>
+        <p:spPr>
+          <a:xfrm>
+            <a:off x="11130711" y="2182685"/>
+            <a:ext cx="931699" cy="153968"/>
+          </a:xfrm>
+          <a:prstGeom prst="rect">
+            <a:avLst/>
+          </a:prstGeom>
+          <a:noFill/>
+        </p:spPr>
+        <p:txBody>
+          <a:bodyPr wrap="square" lIns="0" tIns="0" rIns="0" bIns="0" rtlCol="0" anchor="t">
+            <a:noAutofit/>
+          </a:bodyPr>
+          <a:lstStyle/>
+          <a:p>
+            <a:pPr algn="ctr"/>
+            <a:r>
+              <a:rPr lang="en-US" sz="1050" b="1" dirty="0"/>
+              <a:t>Amazon Elastic </a:t>
+            </a:r>
+            <a:br>
+              <a:rPr lang="en-US" sz="1050" b="1" dirty="0"/>
+            </a:br>
+            <a:r>
+              <a:rPr lang="en-US" sz="1050" b="1" dirty="0"/>
+              <a:t>Transcoder</a:t>
+            </a:r>
+          </a:p>
+        </p:txBody>
+      </p:sp>
+      <p:cxnSp>
+        <p:nvCxnSpPr>
+          <p:cNvPr id="47" name="Straight Arrow Connector 46"/>
+          <p:cNvCxnSpPr>
+            <a:stCxn id="9" idx="3"/>
+            <a:endCxn id="33" idx="1"/>
+          </p:cNvCxnSpPr>
+          <p:nvPr/>
+        </p:nvCxnSpPr>
+        <p:spPr>
+          <a:xfrm>
+            <a:off x="1188709" y="1737172"/>
+            <a:ext cx="3634733" cy="8544"/>
+          </a:xfrm>
+          <a:prstGeom prst="straightConnector1">
+            <a:avLst/>
+          </a:prstGeom>
+          <a:ln w="38100">
+            <a:tailEnd type="triangle"/>
+          </a:ln>
+        </p:spPr>
+        <p:style>
+          <a:lnRef idx="1">
+            <a:schemeClr val="accent1"/>
+          </a:lnRef>
+          <a:fillRef idx="0">
+            <a:schemeClr val="accent1"/>
+          </a:fillRef>
+          <a:effectRef idx="0">
+            <a:schemeClr val="accent1"/>
+          </a:effectRef>
+          <a:fontRef idx="minor">
+            <a:schemeClr val="tx1"/>
+          </a:fontRef>
+        </p:style>
+      </p:cxnSp>
+      <p:grpSp>
+        <p:nvGrpSpPr>
+          <p:cNvPr id="11" name="Group 10"/>
+          <p:cNvGrpSpPr/>
+          <p:nvPr/>
+        </p:nvGrpSpPr>
+        <p:grpSpPr>
+          <a:xfrm>
+            <a:off x="4706593" y="3944497"/>
+            <a:ext cx="1047038" cy="1343087"/>
+            <a:chOff x="5957793" y="1929174"/>
+            <a:chExt cx="1047038" cy="1343087"/>
+          </a:xfrm>
+        </p:grpSpPr>
+        <p:pic>
+          <p:nvPicPr>
+            <p:cNvPr id="49" name="Picture 48"/>
+            <p:cNvPicPr>
+              <a:picLocks noChangeAspect="1"/>
+            </p:cNvPicPr>
+            <p:nvPr/>
+          </p:nvPicPr>
+          <p:blipFill>
+            <a:blip r:embed="rId6">
+              <a:extLst>
+                <a:ext uri="{28A0092B-C50C-407E-A947-70E740481C1C}">
+                  <a14:useLocalDpi xmlns:a14="http://schemas.microsoft.com/office/drawing/2010/main" val="0"/>
+                </a:ext>
+              </a:extLst>
+            </a:blip>
+            <a:stretch>
+              <a:fillRect/>
+            </a:stretch>
+          </p:blipFill>
+          <p:spPr>
+            <a:xfrm>
+              <a:off x="5957793" y="1929174"/>
+              <a:ext cx="1047038" cy="1175421"/>
+            </a:xfrm>
+            <a:prstGeom prst="rect">
+              <a:avLst/>
+            </a:prstGeom>
+          </p:spPr>
+        </p:pic>
+        <p:sp>
+          <p:nvSpPr>
+            <p:cNvPr id="50" name="TextBox 49"/>
+            <p:cNvSpPr txBox="1"/>
+            <p:nvPr/>
+          </p:nvSpPr>
+          <p:spPr>
+            <a:xfrm>
+              <a:off x="5987024" y="3116629"/>
+              <a:ext cx="731520" cy="155632"/>
+            </a:xfrm>
+            <a:prstGeom prst="rect">
+              <a:avLst/>
+            </a:prstGeom>
+            <a:noFill/>
+          </p:spPr>
+          <p:txBody>
+            <a:bodyPr wrap="square" lIns="0" tIns="0" rIns="0" bIns="0" rtlCol="0" anchor="t">
+              <a:noAutofit/>
+            </a:bodyPr>
+            <a:lstStyle/>
+            <a:p>
+              <a:pPr algn="ctr"/>
+              <a:r>
+                <a:rPr lang="en-US" sz="1000" b="1" dirty="0" smtClean="0"/>
+                <a:t>Amazon </a:t>
+              </a:r>
+              <a:r>
+                <a:rPr lang="en-US" sz="1000" b="1" dirty="0" err="1" smtClean="0"/>
+                <a:t>CloudFront</a:t>
+              </a:r>
+              <a:endParaRPr lang="en-US" b="1" dirty="0"/>
+            </a:p>
+          </p:txBody>
+        </p:sp>
+      </p:grpSp>
+      <p:cxnSp>
+        <p:nvCxnSpPr>
+          <p:cNvPr id="52" name="Straight Arrow Connector 51"/>
+          <p:cNvCxnSpPr>
+            <a:stCxn id="33" idx="2"/>
+            <a:endCxn id="49" idx="0"/>
+          </p:cNvCxnSpPr>
+          <p:nvPr/>
+        </p:nvCxnSpPr>
+        <p:spPr>
+          <a:xfrm>
+            <a:off x="5219875" y="2190756"/>
+            <a:ext cx="10237" cy="1753741"/>
+          </a:xfrm>
+          <a:prstGeom prst="straightConnector1">
+            <a:avLst/>
+          </a:prstGeom>
+          <a:ln w="38100">
+            <a:tailEnd type="triangle"/>
+          </a:ln>
+        </p:spPr>
+        <p:style>
+          <a:lnRef idx="1">
+            <a:schemeClr val="accent1"/>
+          </a:lnRef>
+          <a:fillRef idx="0">
+            <a:schemeClr val="accent1"/>
+          </a:fillRef>
+          <a:effectRef idx="0">
+            <a:schemeClr val="accent1"/>
+          </a:effectRef>
+          <a:fontRef idx="minor">
+            <a:schemeClr val="tx1"/>
+          </a:fontRef>
+        </p:style>
+      </p:cxnSp>
+      <p:pic>
+        <p:nvPicPr>
+          <p:cNvPr id="54" name="Picture 53"/>
+          <p:cNvPicPr>
+            <a:picLocks noChangeAspect="1"/>
+          </p:cNvPicPr>
+          <p:nvPr/>
+        </p:nvPicPr>
+        <p:blipFill>
+          <a:blip r:embed="rId7">
+            <a:extLst>
+              <a:ext uri="{28A0092B-C50C-407E-A947-70E740481C1C}">
+                <a14:useLocalDpi xmlns:a14="http://schemas.microsoft.com/office/drawing/2010/main" val="0"/>
+              </a:ext>
+            </a:extLst>
+          </a:blip>
+          <a:stretch>
+            <a:fillRect/>
+          </a:stretch>
+        </p:blipFill>
+        <p:spPr>
+          <a:xfrm>
+            <a:off x="4877577" y="5661080"/>
+            <a:ext cx="766873" cy="886846"/>
+          </a:xfrm>
+          <a:prstGeom prst="rect">
+            <a:avLst/>
+          </a:prstGeom>
+        </p:spPr>
+      </p:pic>
+      <p:sp>
+        <p:nvSpPr>
+          <p:cNvPr id="55" name="TextBox 54"/>
+          <p:cNvSpPr txBox="1"/>
+          <p:nvPr/>
+        </p:nvSpPr>
+        <p:spPr>
+          <a:xfrm>
+            <a:off x="4821376" y="6509309"/>
+            <a:ext cx="894752" cy="155632"/>
+          </a:xfrm>
+          <a:prstGeom prst="rect">
+            <a:avLst/>
+          </a:prstGeom>
+          <a:noFill/>
+        </p:spPr>
+        <p:txBody>
+          <a:bodyPr wrap="square" lIns="0" tIns="0" rIns="0" bIns="0" rtlCol="0" anchor="t">
+            <a:noAutofit/>
+          </a:bodyPr>
+          <a:lstStyle/>
+          <a:p>
+            <a:pPr algn="ctr"/>
+            <a:r>
+              <a:rPr lang="en-US" sz="1000" b="1" dirty="0" smtClean="0"/>
+              <a:t>Amazon</a:t>
+            </a:r>
+            <a:br>
+              <a:rPr lang="en-US" sz="1000" b="1" dirty="0" smtClean="0"/>
+            </a:br>
+            <a:r>
+              <a:rPr lang="en-US" sz="1000" b="1" dirty="0" err="1" smtClean="0"/>
+              <a:t>Cognito</a:t>
+            </a:r>
+            <a:endParaRPr lang="en-US" b="1" dirty="0"/>
+          </a:p>
+        </p:txBody>
+      </p:sp>
+      <p:pic>
+        <p:nvPicPr>
+          <p:cNvPr id="56" name="Picture 55"/>
+          <p:cNvPicPr>
+            <a:picLocks noChangeAspect="1"/>
+          </p:cNvPicPr>
+          <p:nvPr/>
+        </p:nvPicPr>
+        <p:blipFill>
+          <a:blip r:embed="rId8">
+            <a:extLst>
+              <a:ext uri="{28A0092B-C50C-407E-A947-70E740481C1C}">
+                <a14:useLocalDpi xmlns:a14="http://schemas.microsoft.com/office/drawing/2010/main" val="0"/>
+              </a:ext>
+            </a:extLst>
+          </a:blip>
+          <a:stretch>
+            <a:fillRect/>
+          </a:stretch>
+        </p:blipFill>
+        <p:spPr>
+          <a:xfrm>
+            <a:off x="6323318" y="4411808"/>
+            <a:ext cx="795835" cy="886846"/>
+          </a:xfrm>
+          <a:prstGeom prst="rect">
+            <a:avLst/>
+          </a:prstGeom>
+        </p:spPr>
+      </p:pic>
+      <p:sp>
+        <p:nvSpPr>
+          <p:cNvPr id="57" name="TextBox 56"/>
+          <p:cNvSpPr txBox="1"/>
+          <p:nvPr/>
+        </p:nvSpPr>
+        <p:spPr>
+          <a:xfrm>
+            <a:off x="6095248" y="5154168"/>
+            <a:ext cx="894752" cy="155632"/>
+          </a:xfrm>
+          <a:prstGeom prst="rect">
+            <a:avLst/>
+          </a:prstGeom>
+          <a:noFill/>
+        </p:spPr>
+        <p:txBody>
+          <a:bodyPr wrap="square" lIns="0" tIns="0" rIns="0" bIns="0" rtlCol="0" anchor="t">
+            <a:noAutofit/>
+          </a:bodyPr>
+          <a:lstStyle/>
+          <a:p>
+            <a:pPr algn="ctr"/>
+            <a:r>
+              <a:rPr lang="en-US" sz="1000" b="1" dirty="0" smtClean="0"/>
+              <a:t>Amazon API Gateway*</a:t>
+            </a:r>
+            <a:endParaRPr lang="en-US" b="1" dirty="0"/>
+          </a:p>
+        </p:txBody>
+      </p:sp>
+      <p:cxnSp>
+        <p:nvCxnSpPr>
+          <p:cNvPr id="60" name="Straight Arrow Connector 59"/>
+          <p:cNvCxnSpPr>
+            <a:endCxn id="88" idx="1"/>
+          </p:cNvCxnSpPr>
+          <p:nvPr/>
+        </p:nvCxnSpPr>
+        <p:spPr>
+          <a:xfrm>
+            <a:off x="5547272" y="2019708"/>
+            <a:ext cx="2873835" cy="1147069"/>
+          </a:xfrm>
+          <a:prstGeom prst="straightConnector1">
+            <a:avLst/>
+          </a:prstGeom>
+          <a:ln w="38100">
+            <a:tailEnd type="triangle"/>
+          </a:ln>
+        </p:spPr>
+        <p:style>
+          <a:lnRef idx="1">
+            <a:schemeClr val="accent1"/>
+          </a:lnRef>
+          <a:fillRef idx="0">
+            <a:schemeClr val="accent1"/>
+          </a:fillRef>
+          <a:effectRef idx="0">
+            <a:schemeClr val="accent1"/>
+          </a:effectRef>
+          <a:fontRef idx="minor">
+            <a:schemeClr val="tx1"/>
+          </a:fontRef>
+        </p:style>
+      </p:cxnSp>
+      <p:grpSp>
+        <p:nvGrpSpPr>
+          <p:cNvPr id="71" name="Group 70"/>
+          <p:cNvGrpSpPr/>
+          <p:nvPr/>
+        </p:nvGrpSpPr>
+        <p:grpSpPr>
+          <a:xfrm>
+            <a:off x="13064" y="3848923"/>
+            <a:ext cx="1528744" cy="1355674"/>
+            <a:chOff x="-32453" y="4411845"/>
+            <a:chExt cx="2009670" cy="1788371"/>
+          </a:xfrm>
+        </p:grpSpPr>
+        <p:pic>
+          <p:nvPicPr>
+            <p:cNvPr id="72" name="Picture 71"/>
+            <p:cNvPicPr>
+              <a:picLocks noChangeAspect="1"/>
+            </p:cNvPicPr>
+            <p:nvPr/>
+          </p:nvPicPr>
+          <p:blipFill>
+            <a:blip r:embed="rId9">
+              <a:extLst>
+                <a:ext uri="{28A0092B-C50C-407E-A947-70E740481C1C}">
+                  <a14:useLocalDpi xmlns:a14="http://schemas.microsoft.com/office/drawing/2010/main" val="0"/>
+                </a:ext>
+              </a:extLst>
+            </a:blip>
+            <a:stretch>
+              <a:fillRect/>
+            </a:stretch>
+          </p:blipFill>
+          <p:spPr>
+            <a:xfrm>
+              <a:off x="1245697" y="4795067"/>
+              <a:ext cx="731520" cy="731520"/>
+            </a:xfrm>
+            <a:prstGeom prst="rect">
+              <a:avLst/>
+            </a:prstGeom>
+          </p:spPr>
+        </p:pic>
+        <p:pic>
+          <p:nvPicPr>
+            <p:cNvPr id="8" name="Picture 7" descr="Users.png"/>
+            <p:cNvPicPr>
+              <a:picLocks noChangeAspect="1"/>
+            </p:cNvPicPr>
+            <p:nvPr/>
+          </p:nvPicPr>
+          <p:blipFill>
+            <a:blip r:embed="rId10">
+              <a:extLst>
+                <a:ext uri="{28A0092B-C50C-407E-A947-70E740481C1C}">
+                  <a14:useLocalDpi xmlns:a14="http://schemas.microsoft.com/office/drawing/2010/main" val="0"/>
+                </a:ext>
+              </a:extLst>
+            </a:blip>
+            <a:stretch>
+              <a:fillRect/>
+            </a:stretch>
+          </p:blipFill>
+          <p:spPr>
+            <a:xfrm>
+              <a:off x="-32453" y="4411845"/>
+              <a:ext cx="1741305" cy="1741305"/>
+            </a:xfrm>
+            <a:prstGeom prst="rect">
+              <a:avLst/>
+            </a:prstGeom>
+          </p:spPr>
+        </p:pic>
+        <p:pic>
+          <p:nvPicPr>
+            <p:cNvPr id="73" name="Picture 72"/>
+            <p:cNvPicPr>
+              <a:picLocks noChangeAspect="1"/>
+            </p:cNvPicPr>
+            <p:nvPr/>
+          </p:nvPicPr>
+          <p:blipFill>
+            <a:blip r:embed="rId11">
+              <a:extLst>
+                <a:ext uri="{28A0092B-C50C-407E-A947-70E740481C1C}">
+                  <a14:useLocalDpi xmlns:a14="http://schemas.microsoft.com/office/drawing/2010/main" val="0"/>
+                </a:ext>
+              </a:extLst>
+            </a:blip>
+            <a:stretch>
+              <a:fillRect/>
+            </a:stretch>
+          </p:blipFill>
+          <p:spPr>
+            <a:xfrm>
+              <a:off x="1374230" y="5468696"/>
+              <a:ext cx="479271" cy="731520"/>
+            </a:xfrm>
+            <a:prstGeom prst="rect">
+              <a:avLst/>
+            </a:prstGeom>
+          </p:spPr>
+        </p:pic>
+      </p:grpSp>
+      <p:pic>
+        <p:nvPicPr>
+          <p:cNvPr id="75" name="Picture 74"/>
+          <p:cNvPicPr>
+            <a:picLocks noChangeAspect="1"/>
+          </p:cNvPicPr>
+          <p:nvPr/>
+        </p:nvPicPr>
+        <p:blipFill>
+          <a:blip r:embed="rId12">
+            <a:extLst>
+              <a:ext uri="{28A0092B-C50C-407E-A947-70E740481C1C}">
+                <a14:useLocalDpi xmlns:a14="http://schemas.microsoft.com/office/drawing/2010/main" val="0"/>
+              </a:ext>
+            </a:extLst>
+          </a:blip>
+          <a:stretch>
+            <a:fillRect/>
+          </a:stretch>
+        </p:blipFill>
+        <p:spPr>
+          <a:xfrm>
+            <a:off x="8395515" y="5584210"/>
+            <a:ext cx="769853" cy="833643"/>
+          </a:xfrm>
+          <a:prstGeom prst="rect">
+            <a:avLst/>
+          </a:prstGeom>
+        </p:spPr>
+      </p:pic>
+      <p:cxnSp>
+        <p:nvCxnSpPr>
+          <p:cNvPr id="76" name="Straight Arrow Connector 75"/>
+          <p:cNvCxnSpPr>
+            <a:stCxn id="75" idx="1"/>
+          </p:cNvCxnSpPr>
+          <p:nvPr/>
+        </p:nvCxnSpPr>
+        <p:spPr>
+          <a:xfrm flipH="1" flipV="1">
+            <a:off x="6932889" y="5011998"/>
+            <a:ext cx="1462626" cy="989034"/>
+          </a:xfrm>
+          <a:prstGeom prst="straightConnector1">
+            <a:avLst/>
+          </a:prstGeom>
+          <a:ln w="38100">
+            <a:headEnd type="triangle" w="med" len="med"/>
+            <a:tailEnd type="triangle" w="med" len="med"/>
+          </a:ln>
+        </p:spPr>
+        <p:style>
+          <a:lnRef idx="1">
+            <a:schemeClr val="accent1"/>
+          </a:lnRef>
+          <a:fillRef idx="0">
+            <a:schemeClr val="accent1"/>
+          </a:fillRef>
+          <a:effectRef idx="0">
+            <a:schemeClr val="accent1"/>
+          </a:effectRef>
+          <a:fontRef idx="minor">
+            <a:schemeClr val="tx1"/>
+          </a:fontRef>
+        </p:style>
+      </p:cxnSp>
+      <p:pic>
+        <p:nvPicPr>
+          <p:cNvPr id="79" name="Picture 78"/>
+          <p:cNvPicPr>
+            <a:picLocks noChangeAspect="1"/>
+          </p:cNvPicPr>
+          <p:nvPr/>
+        </p:nvPicPr>
+        <p:blipFill>
+          <a:blip r:embed="rId13">
+            <a:extLst>
+              <a:ext uri="{28A0092B-C50C-407E-A947-70E740481C1C}">
+                <a14:useLocalDpi xmlns:a14="http://schemas.microsoft.com/office/drawing/2010/main" val="0"/>
+              </a:ext>
+            </a:extLst>
+          </a:blip>
+          <a:stretch>
+            <a:fillRect/>
+          </a:stretch>
+        </p:blipFill>
+        <p:spPr>
+          <a:xfrm>
+            <a:off x="11164639" y="4701266"/>
+            <a:ext cx="817739" cy="905805"/>
+          </a:xfrm>
+          <a:prstGeom prst="rect">
+            <a:avLst/>
+          </a:prstGeom>
+        </p:spPr>
+      </p:pic>
+      <p:sp>
+        <p:nvSpPr>
+          <p:cNvPr id="80" name="TextBox 79"/>
+          <p:cNvSpPr txBox="1"/>
+          <p:nvPr/>
+        </p:nvSpPr>
+        <p:spPr>
+          <a:xfrm>
+            <a:off x="11126132" y="5608165"/>
+            <a:ext cx="894752" cy="155632"/>
+          </a:xfrm>
+          <a:prstGeom prst="rect">
+            <a:avLst/>
+          </a:prstGeom>
+          <a:noFill/>
+        </p:spPr>
+        <p:txBody>
+          <a:bodyPr wrap="square" lIns="0" tIns="0" rIns="0" bIns="0" rtlCol="0" anchor="t">
+            <a:noAutofit/>
+          </a:bodyPr>
+          <a:lstStyle/>
+          <a:p>
+            <a:pPr algn="ctr"/>
+            <a:r>
+              <a:rPr lang="en-US" sz="1000" b="1" dirty="0" smtClean="0"/>
+              <a:t>Amazon</a:t>
+            </a:r>
+            <a:br>
+              <a:rPr lang="en-US" sz="1000" b="1" dirty="0" smtClean="0"/>
+            </a:br>
+            <a:r>
+              <a:rPr lang="en-US" sz="1000" b="1" dirty="0" err="1" smtClean="0"/>
+              <a:t>DynamoDB</a:t>
+            </a:r>
+            <a:endParaRPr lang="en-US" b="1" dirty="0"/>
+          </a:p>
+        </p:txBody>
+      </p:sp>
+      <p:pic>
+        <p:nvPicPr>
+          <p:cNvPr id="86" name="Picture 85"/>
+          <p:cNvPicPr>
+            <a:picLocks noChangeAspect="1"/>
+          </p:cNvPicPr>
+          <p:nvPr/>
+        </p:nvPicPr>
+        <p:blipFill>
+          <a:blip r:embed="rId14">
+            <a:extLst>
+              <a:ext uri="{28A0092B-C50C-407E-A947-70E740481C1C}">
+                <a14:useLocalDpi xmlns:a14="http://schemas.microsoft.com/office/drawing/2010/main" val="0"/>
+              </a:ext>
+            </a:extLst>
+          </a:blip>
+          <a:stretch>
+            <a:fillRect/>
+          </a:stretch>
+        </p:blipFill>
+        <p:spPr>
+          <a:xfrm>
+            <a:off x="2395963" y="1426437"/>
+            <a:ext cx="630722" cy="609698"/>
+          </a:xfrm>
+          <a:prstGeom prst="rect">
+            <a:avLst/>
+          </a:prstGeom>
+        </p:spPr>
+      </p:pic>
+      <p:sp>
+        <p:nvSpPr>
+          <p:cNvPr id="87" name="TextBox 86"/>
+          <p:cNvSpPr txBox="1"/>
+          <p:nvPr/>
+        </p:nvSpPr>
+        <p:spPr>
+          <a:xfrm>
+            <a:off x="8421832" y="3576340"/>
+            <a:ext cx="798808" cy="147068"/>
+          </a:xfrm>
+          <a:prstGeom prst="rect">
+            <a:avLst/>
+          </a:prstGeom>
+          <a:noFill/>
+        </p:spPr>
+        <p:txBody>
+          <a:bodyPr wrap="square" lIns="0" tIns="0" rIns="0" bIns="0" rtlCol="0" anchor="t">
+            <a:noAutofit/>
+          </a:bodyPr>
+          <a:lstStyle/>
+          <a:p>
+            <a:pPr algn="ctr"/>
+            <a:r>
+              <a:rPr lang="en-US" sz="1050" b="1" smtClean="0"/>
+              <a:t>ProcessVideo</a:t>
+            </a:r>
+            <a:endParaRPr lang="en-US" sz="1050" b="1" dirty="0"/>
+          </a:p>
+        </p:txBody>
+      </p:sp>
+      <p:pic>
+        <p:nvPicPr>
+          <p:cNvPr id="88" name="Picture 87"/>
+          <p:cNvPicPr>
+            <a:picLocks noChangeAspect="1"/>
+          </p:cNvPicPr>
+          <p:nvPr/>
+        </p:nvPicPr>
+        <p:blipFill>
+          <a:blip r:embed="rId12">
+            <a:extLst>
+              <a:ext uri="{28A0092B-C50C-407E-A947-70E740481C1C}">
+                <a14:useLocalDpi xmlns:a14="http://schemas.microsoft.com/office/drawing/2010/main" val="0"/>
+              </a:ext>
+            </a:extLst>
+          </a:blip>
+          <a:stretch>
+            <a:fillRect/>
+          </a:stretch>
+        </p:blipFill>
+        <p:spPr>
+          <a:xfrm>
+            <a:off x="8421107" y="2749955"/>
+            <a:ext cx="769853" cy="833643"/>
+          </a:xfrm>
+          <a:prstGeom prst="rect">
+            <a:avLst/>
+          </a:prstGeom>
+        </p:spPr>
+      </p:pic>
+      <p:cxnSp>
+        <p:nvCxnSpPr>
+          <p:cNvPr id="89" name="Straight Arrow Connector 88"/>
+          <p:cNvCxnSpPr>
+            <a:stCxn id="39" idx="1"/>
+            <a:endCxn id="33" idx="3"/>
+          </p:cNvCxnSpPr>
+          <p:nvPr/>
+        </p:nvCxnSpPr>
+        <p:spPr>
+          <a:xfrm flipH="1" flipV="1">
+            <a:off x="5616307" y="1745716"/>
+            <a:ext cx="5539974" cy="20147"/>
+          </a:xfrm>
+          <a:prstGeom prst="straightConnector1">
+            <a:avLst/>
+          </a:prstGeom>
+          <a:ln w="38100">
+            <a:headEnd type="triangle" w="med" len="med"/>
+            <a:tailEnd type="triangle" w="med" len="med"/>
+          </a:ln>
+        </p:spPr>
+        <p:style>
+          <a:lnRef idx="1">
+            <a:schemeClr val="accent1"/>
+          </a:lnRef>
+          <a:fillRef idx="0">
+            <a:schemeClr val="accent1"/>
+          </a:fillRef>
+          <a:effectRef idx="0">
+            <a:schemeClr val="accent1"/>
+          </a:effectRef>
+          <a:fontRef idx="minor">
+            <a:schemeClr val="tx1"/>
+          </a:fontRef>
+        </p:style>
+      </p:cxnSp>
+      <p:cxnSp>
+        <p:nvCxnSpPr>
+          <p:cNvPr id="98" name="Straight Arrow Connector 97"/>
+          <p:cNvCxnSpPr/>
+          <p:nvPr/>
+        </p:nvCxnSpPr>
+        <p:spPr>
+          <a:xfrm flipH="1">
+            <a:off x="9091877" y="2070478"/>
+            <a:ext cx="2148950" cy="763397"/>
+          </a:xfrm>
+          <a:prstGeom prst="straightConnector1">
+            <a:avLst/>
+          </a:prstGeom>
+          <a:ln w="38100">
+            <a:solidFill>
+              <a:schemeClr val="accent1"/>
+            </a:solidFill>
+            <a:headEnd type="none" w="med" len="med"/>
+            <a:tailEnd type="triangle" w="med" len="med"/>
+          </a:ln>
+        </p:spPr>
+        <p:style>
+          <a:lnRef idx="1">
+            <a:schemeClr val="accent1"/>
+          </a:lnRef>
+          <a:fillRef idx="0">
+            <a:schemeClr val="accent1"/>
+          </a:fillRef>
+          <a:effectRef idx="0">
+            <a:schemeClr val="accent1"/>
+          </a:effectRef>
+          <a:fontRef idx="minor">
+            <a:schemeClr val="tx1"/>
+          </a:fontRef>
+        </p:style>
+      </p:cxnSp>
+      <p:sp>
+        <p:nvSpPr>
+          <p:cNvPr id="102" name="TextBox 101"/>
+          <p:cNvSpPr txBox="1"/>
+          <p:nvPr/>
+        </p:nvSpPr>
+        <p:spPr>
+          <a:xfrm rot="20444859">
+            <a:off x="10223320" y="2102702"/>
+            <a:ext cx="752129" cy="400110"/>
+          </a:xfrm>
+          <a:prstGeom prst="rect">
+            <a:avLst/>
+          </a:prstGeom>
+          <a:noFill/>
+          <a:effectLst>
+            <a:glow rad="304800">
+              <a:schemeClr val="bg1"/>
+            </a:glow>
+          </a:effectLst>
+        </p:spPr>
+        <p:txBody>
+          <a:bodyPr wrap="none" rtlCol="0">
+            <a:spAutoFit/>
+          </a:bodyPr>
+          <a:lstStyle/>
+          <a:p>
+            <a:r>
+              <a:rPr lang="en-US" sz="1000" dirty="0" smtClean="0">
+                <a:effectLst>
+                  <a:glow rad="76200">
+                    <a:schemeClr val="bg1">
+                      <a:alpha val="90000"/>
+                    </a:schemeClr>
+                  </a:glow>
+                </a:effectLst>
+              </a:rPr>
+              <a:t>Transcode </a:t>
+            </a:r>
+          </a:p>
+          <a:p>
+            <a:r>
+              <a:rPr lang="en-US" sz="1000" dirty="0" smtClean="0">
+                <a:effectLst>
+                  <a:glow rad="76200">
+                    <a:schemeClr val="bg1">
+                      <a:alpha val="90000"/>
+                    </a:schemeClr>
+                  </a:glow>
+                </a:effectLst>
+              </a:rPr>
+              <a:t>complete</a:t>
+            </a:r>
+          </a:p>
+        </p:txBody>
+      </p:sp>
+      <p:sp>
+        <p:nvSpPr>
+          <p:cNvPr id="106" name="TextBox 105"/>
+          <p:cNvSpPr txBox="1"/>
+          <p:nvPr/>
+        </p:nvSpPr>
+        <p:spPr>
+          <a:xfrm>
+            <a:off x="5536121" y="1541389"/>
+            <a:ext cx="819456" cy="400110"/>
+          </a:xfrm>
+          <a:prstGeom prst="rect">
+            <a:avLst/>
+          </a:prstGeom>
+          <a:noFill/>
+          <a:effectLst>
+            <a:glow rad="304800">
+              <a:schemeClr val="bg1"/>
+            </a:glow>
+          </a:effectLst>
+        </p:spPr>
+        <p:txBody>
+          <a:bodyPr wrap="none" rtlCol="0">
+            <a:spAutoFit/>
+          </a:bodyPr>
+          <a:lstStyle/>
+          <a:p>
+            <a:pPr algn="ctr"/>
+            <a:r>
+              <a:rPr lang="en-US" sz="1000" dirty="0" smtClean="0">
+                <a:effectLst>
+                  <a:glow rad="76200">
+                    <a:schemeClr val="bg1">
+                      <a:alpha val="90000"/>
+                    </a:schemeClr>
+                  </a:glow>
+                </a:effectLst>
+              </a:rPr>
+              <a:t>Transcoded </a:t>
+            </a:r>
+          </a:p>
+          <a:p>
+            <a:pPr algn="ctr"/>
+            <a:r>
+              <a:rPr lang="en-US" sz="1000" dirty="0" smtClean="0">
+                <a:effectLst>
+                  <a:glow rad="76200">
+                    <a:schemeClr val="bg1">
+                      <a:alpha val="90000"/>
+                    </a:schemeClr>
+                  </a:glow>
+                </a:effectLst>
+              </a:rPr>
+              <a:t>video files</a:t>
+            </a:r>
+          </a:p>
+        </p:txBody>
+      </p:sp>
+      <p:sp>
+        <p:nvSpPr>
+          <p:cNvPr id="107" name="TextBox 106"/>
+          <p:cNvSpPr txBox="1"/>
+          <p:nvPr/>
+        </p:nvSpPr>
+        <p:spPr>
+          <a:xfrm>
+            <a:off x="10421863" y="1560504"/>
+            <a:ext cx="708848" cy="400110"/>
+          </a:xfrm>
+          <a:prstGeom prst="rect">
+            <a:avLst/>
+          </a:prstGeom>
+          <a:noFill/>
+          <a:effectLst>
+            <a:glow rad="304800">
+              <a:schemeClr val="bg1"/>
+            </a:glow>
+          </a:effectLst>
+        </p:spPr>
+        <p:txBody>
+          <a:bodyPr wrap="none" rtlCol="0">
+            <a:spAutoFit/>
+          </a:bodyPr>
+          <a:lstStyle/>
+          <a:p>
+            <a:pPr algn="r"/>
+            <a:r>
+              <a:rPr lang="en-US" sz="1000" dirty="0" smtClean="0">
+                <a:effectLst>
+                  <a:glow rad="76200">
+                    <a:schemeClr val="bg1">
+                      <a:alpha val="90000"/>
+                    </a:schemeClr>
+                  </a:glow>
+                </a:effectLst>
+              </a:rPr>
+              <a:t>Source</a:t>
+            </a:r>
+          </a:p>
+          <a:p>
+            <a:pPr algn="r"/>
+            <a:r>
+              <a:rPr lang="en-US" sz="1000" dirty="0" smtClean="0">
+                <a:effectLst>
+                  <a:glow rad="76200">
+                    <a:schemeClr val="bg1">
+                      <a:alpha val="90000"/>
+                    </a:schemeClr>
+                  </a:glow>
+                </a:effectLst>
+              </a:rPr>
+              <a:t>video files</a:t>
+            </a:r>
+          </a:p>
+        </p:txBody>
+      </p:sp>
+      <p:sp>
+        <p:nvSpPr>
+          <p:cNvPr id="108" name="TextBox 107"/>
+          <p:cNvSpPr txBox="1"/>
+          <p:nvPr/>
+        </p:nvSpPr>
+        <p:spPr>
+          <a:xfrm>
+            <a:off x="2356900" y="1089815"/>
+            <a:ext cx="708848" cy="400110"/>
+          </a:xfrm>
+          <a:prstGeom prst="rect">
+            <a:avLst/>
+          </a:prstGeom>
+          <a:noFill/>
+          <a:effectLst>
+            <a:glow rad="304800">
+              <a:schemeClr val="bg1"/>
+            </a:glow>
+          </a:effectLst>
+        </p:spPr>
+        <p:txBody>
+          <a:bodyPr wrap="none" rtlCol="0">
+            <a:spAutoFit/>
+          </a:bodyPr>
+          <a:lstStyle/>
+          <a:p>
+            <a:pPr algn="ctr"/>
+            <a:r>
+              <a:rPr lang="en-US" sz="1000" dirty="0" smtClean="0">
+                <a:effectLst>
+                  <a:glow rad="76200">
+                    <a:schemeClr val="bg1">
+                      <a:alpha val="90000"/>
+                    </a:schemeClr>
+                  </a:glow>
+                </a:effectLst>
+              </a:rPr>
+              <a:t>Replay</a:t>
+            </a:r>
+          </a:p>
+          <a:p>
+            <a:pPr algn="ctr"/>
+            <a:r>
+              <a:rPr lang="en-US" sz="1000" dirty="0" smtClean="0">
+                <a:effectLst>
+                  <a:glow rad="76200">
+                    <a:schemeClr val="bg1">
+                      <a:alpha val="90000"/>
+                    </a:schemeClr>
+                  </a:glow>
+                </a:effectLst>
+              </a:rPr>
+              <a:t>video files</a:t>
+            </a:r>
+          </a:p>
+        </p:txBody>
+      </p:sp>
+      <p:grpSp>
+        <p:nvGrpSpPr>
+          <p:cNvPr id="41" name="Group 40"/>
+          <p:cNvGrpSpPr/>
+          <p:nvPr/>
+        </p:nvGrpSpPr>
+        <p:grpSpPr>
+          <a:xfrm>
+            <a:off x="9580502" y="2218324"/>
+            <a:ext cx="1043415" cy="642002"/>
+            <a:chOff x="5327758" y="4947288"/>
+            <a:chExt cx="1391220" cy="856002"/>
+          </a:xfrm>
+        </p:grpSpPr>
+        <p:pic>
+          <p:nvPicPr>
+            <p:cNvPr id="42" name="Picture 41"/>
+            <p:cNvPicPr>
+              <a:picLocks noChangeAspect="1"/>
+            </p:cNvPicPr>
+            <p:nvPr/>
+          </p:nvPicPr>
+          <p:blipFill>
+            <a:blip r:embed="rId15">
+              <a:extLst>
+                <a:ext uri="{28A0092B-C50C-407E-A947-70E740481C1C}">
+                  <a14:useLocalDpi xmlns:a14="http://schemas.microsoft.com/office/drawing/2010/main" val="0"/>
+                </a:ext>
+              </a:extLst>
+            </a:blip>
+            <a:stretch>
+              <a:fillRect/>
+            </a:stretch>
+          </p:blipFill>
+          <p:spPr>
+            <a:xfrm>
+              <a:off x="5718041" y="4947288"/>
+              <a:ext cx="610654" cy="687721"/>
+            </a:xfrm>
+            <a:prstGeom prst="rect">
+              <a:avLst/>
+            </a:prstGeom>
+          </p:spPr>
+        </p:pic>
+        <p:sp>
+          <p:nvSpPr>
+            <p:cNvPr id="43" name="TextBox 42"/>
+            <p:cNvSpPr txBox="1"/>
+            <p:nvPr/>
+          </p:nvSpPr>
+          <p:spPr>
+            <a:xfrm>
+              <a:off x="5327758" y="5584409"/>
+              <a:ext cx="1391220" cy="218881"/>
+            </a:xfrm>
+            <a:prstGeom prst="rect">
+              <a:avLst/>
+            </a:prstGeom>
+            <a:noFill/>
+          </p:spPr>
+          <p:txBody>
+            <a:bodyPr wrap="square" lIns="0" tIns="0" rIns="0" bIns="0" rtlCol="0" anchor="t">
+              <a:noAutofit/>
+            </a:bodyPr>
+            <a:lstStyle/>
+            <a:p>
+              <a:pPr algn="ctr"/>
+              <a:r>
+                <a:rPr lang="en-US" sz="1050" b="1" smtClean="0"/>
+                <a:t>Amazon</a:t>
+              </a:r>
+              <a:r>
+                <a:rPr lang="en-US" sz="1050" b="1"/>
+                <a:t> </a:t>
+              </a:r>
+              <a:r>
+                <a:rPr lang="en-US" sz="1050" b="1" smtClean="0"/>
+                <a:t>SNS</a:t>
+              </a:r>
+              <a:endParaRPr lang="en-US" sz="1050" b="1" dirty="0"/>
+            </a:p>
+          </p:txBody>
+        </p:sp>
+      </p:grpSp>
+      <p:cxnSp>
+        <p:nvCxnSpPr>
+          <p:cNvPr id="118" name="Straight Arrow Connector 117"/>
+          <p:cNvCxnSpPr>
+            <a:stCxn id="88" idx="3"/>
+            <a:endCxn id="79" idx="0"/>
+          </p:cNvCxnSpPr>
+          <p:nvPr/>
+        </p:nvCxnSpPr>
+        <p:spPr>
+          <a:xfrm>
+            <a:off x="9190960" y="3166777"/>
+            <a:ext cx="2382549" cy="1534489"/>
+          </a:xfrm>
+          <a:prstGeom prst="straightConnector1">
+            <a:avLst/>
+          </a:prstGeom>
+          <a:ln w="38100">
+            <a:tailEnd type="triangle"/>
+          </a:ln>
+        </p:spPr>
+        <p:style>
+          <a:lnRef idx="1">
+            <a:schemeClr val="accent1"/>
+          </a:lnRef>
+          <a:fillRef idx="0">
+            <a:schemeClr val="accent1"/>
+          </a:fillRef>
+          <a:effectRef idx="0">
+            <a:schemeClr val="accent1"/>
+          </a:effectRef>
+          <a:fontRef idx="minor">
+            <a:schemeClr val="tx1"/>
+          </a:fontRef>
+        </p:style>
+      </p:cxnSp>
+      <p:sp>
+        <p:nvSpPr>
+          <p:cNvPr id="124" name="TextBox 123"/>
+          <p:cNvSpPr txBox="1"/>
+          <p:nvPr/>
+        </p:nvSpPr>
+        <p:spPr>
+          <a:xfrm rot="2002906">
+            <a:off x="10565251" y="4113745"/>
+            <a:ext cx="790666" cy="400110"/>
+          </a:xfrm>
+          <a:prstGeom prst="rect">
+            <a:avLst/>
+          </a:prstGeom>
+          <a:noFill/>
+          <a:effectLst>
+            <a:glow rad="304800">
+              <a:schemeClr val="bg1"/>
+            </a:glow>
+          </a:effectLst>
+        </p:spPr>
+        <p:txBody>
+          <a:bodyPr wrap="none" rtlCol="0">
+            <a:spAutoFit/>
+          </a:bodyPr>
+          <a:lstStyle/>
+          <a:p>
+            <a:pPr algn="r"/>
+            <a:r>
+              <a:rPr lang="en-US" sz="1000" dirty="0" smtClean="0">
+                <a:effectLst>
+                  <a:glow rad="76200">
+                    <a:schemeClr val="bg1">
+                      <a:alpha val="90000"/>
+                    </a:schemeClr>
+                  </a:glow>
+                </a:effectLst>
+              </a:rPr>
+              <a:t>Transcoded</a:t>
+            </a:r>
+          </a:p>
+          <a:p>
+            <a:pPr algn="r"/>
+            <a:r>
+              <a:rPr lang="en-US" sz="1000" dirty="0" smtClean="0">
+                <a:effectLst>
+                  <a:glow rad="76200">
+                    <a:schemeClr val="bg1">
+                      <a:alpha val="90000"/>
+                    </a:schemeClr>
+                  </a:glow>
+                </a:effectLst>
+              </a:rPr>
+              <a:t>Video info</a:t>
+            </a:r>
+          </a:p>
+        </p:txBody>
+      </p:sp>
+      <p:cxnSp>
+        <p:nvCxnSpPr>
+          <p:cNvPr id="125" name="Straight Arrow Connector 124"/>
+          <p:cNvCxnSpPr>
+            <a:endCxn id="75" idx="3"/>
+          </p:cNvCxnSpPr>
+          <p:nvPr/>
+        </p:nvCxnSpPr>
+        <p:spPr>
+          <a:xfrm flipH="1">
+            <a:off x="9165368" y="5577563"/>
+            <a:ext cx="1965405" cy="423469"/>
+          </a:xfrm>
+          <a:prstGeom prst="straightConnector1">
+            <a:avLst/>
+          </a:prstGeom>
+          <a:ln w="38100">
+            <a:headEnd type="triangle" w="med" len="med"/>
+            <a:tailEnd type="triangle" w="med" len="med"/>
+          </a:ln>
+        </p:spPr>
+        <p:style>
+          <a:lnRef idx="1">
+            <a:schemeClr val="accent1"/>
+          </a:lnRef>
+          <a:fillRef idx="0">
+            <a:schemeClr val="accent1"/>
+          </a:fillRef>
+          <a:effectRef idx="0">
+            <a:schemeClr val="accent1"/>
+          </a:effectRef>
+          <a:fontRef idx="minor">
+            <a:schemeClr val="tx1"/>
+          </a:fontRef>
+        </p:style>
+      </p:cxnSp>
+      <p:cxnSp>
+        <p:nvCxnSpPr>
+          <p:cNvPr id="130" name="Straight Arrow Connector 129"/>
+          <p:cNvCxnSpPr>
+            <a:stCxn id="54" idx="1"/>
+            <a:endCxn id="73" idx="2"/>
+          </p:cNvCxnSpPr>
+          <p:nvPr/>
+        </p:nvCxnSpPr>
+        <p:spPr>
+          <a:xfrm rot="10800000">
+            <a:off x="1265409" y="5204597"/>
+            <a:ext cx="3612168" cy="899906"/>
+          </a:xfrm>
+          <a:prstGeom prst="bentConnector2">
+            <a:avLst/>
+          </a:prstGeom>
+          <a:ln w="38100">
+            <a:headEnd type="triangle" w="med" len="med"/>
+            <a:tailEnd type="triangle" w="med" len="med"/>
+          </a:ln>
+        </p:spPr>
+        <p:style>
+          <a:lnRef idx="1">
+            <a:schemeClr val="accent1"/>
+          </a:lnRef>
+          <a:fillRef idx="0">
+            <a:schemeClr val="accent1"/>
+          </a:fillRef>
+          <a:effectRef idx="0">
+            <a:schemeClr val="accent1"/>
+          </a:effectRef>
+          <a:fontRef idx="minor">
+            <a:schemeClr val="tx1"/>
+          </a:fontRef>
+        </p:style>
+      </p:cxnSp>
+      <p:pic>
+        <p:nvPicPr>
+          <p:cNvPr id="133" name="Picture 132"/>
+          <p:cNvPicPr>
+            <a:picLocks noChangeAspect="1"/>
+          </p:cNvPicPr>
+          <p:nvPr/>
+        </p:nvPicPr>
+        <p:blipFill>
+          <a:blip r:embed="rId16">
+            <a:extLst>
+              <a:ext uri="{28A0092B-C50C-407E-A947-70E740481C1C}">
+                <a14:useLocalDpi xmlns:a14="http://schemas.microsoft.com/office/drawing/2010/main" val="0"/>
+              </a:ext>
+            </a:extLst>
+          </a:blip>
+          <a:stretch>
+            <a:fillRect/>
+          </a:stretch>
+        </p:blipFill>
+        <p:spPr>
+          <a:xfrm>
+            <a:off x="2185692" y="4156439"/>
+            <a:ext cx="1066292" cy="1066292"/>
+          </a:xfrm>
+          <a:prstGeom prst="rect">
+            <a:avLst/>
+          </a:prstGeom>
+        </p:spPr>
+      </p:pic>
+      <p:cxnSp>
+        <p:nvCxnSpPr>
+          <p:cNvPr id="135" name="Straight Arrow Connector 134"/>
+          <p:cNvCxnSpPr/>
+          <p:nvPr/>
+        </p:nvCxnSpPr>
+        <p:spPr>
+          <a:xfrm flipH="1">
+            <a:off x="3013677" y="4279481"/>
+            <a:ext cx="1733041" cy="9948"/>
+          </a:xfrm>
+          <a:prstGeom prst="straightConnector1">
+            <a:avLst/>
+          </a:prstGeom>
+          <a:ln w="38100">
+            <a:headEnd type="none" w="med" len="med"/>
+            <a:tailEnd type="triangle" w="med" len="med"/>
+          </a:ln>
+        </p:spPr>
+        <p:style>
+          <a:lnRef idx="1">
+            <a:schemeClr val="accent1"/>
+          </a:lnRef>
+          <a:fillRef idx="0">
+            <a:schemeClr val="accent1"/>
+          </a:fillRef>
+          <a:effectRef idx="0">
+            <a:schemeClr val="accent1"/>
+          </a:effectRef>
+          <a:fontRef idx="minor">
+            <a:schemeClr val="tx1"/>
+          </a:fontRef>
+        </p:style>
+      </p:cxnSp>
+      <p:cxnSp>
+        <p:nvCxnSpPr>
+          <p:cNvPr id="139" name="Straight Arrow Connector 138"/>
+          <p:cNvCxnSpPr>
+            <a:stCxn id="146" idx="3"/>
+          </p:cNvCxnSpPr>
+          <p:nvPr/>
+        </p:nvCxnSpPr>
+        <p:spPr>
+          <a:xfrm flipH="1">
+            <a:off x="3088233" y="5087165"/>
+            <a:ext cx="1651454" cy="65"/>
+          </a:xfrm>
+          <a:prstGeom prst="straightConnector1">
+            <a:avLst/>
+          </a:prstGeom>
+          <a:ln w="38100">
+            <a:headEnd type="triangle" w="med" len="med"/>
+            <a:tailEnd type="triangle" w="med" len="med"/>
+          </a:ln>
+        </p:spPr>
+        <p:style>
+          <a:lnRef idx="1">
+            <a:schemeClr val="accent1"/>
+          </a:lnRef>
+          <a:fillRef idx="0">
+            <a:schemeClr val="accent1"/>
+          </a:fillRef>
+          <a:effectRef idx="0">
+            <a:schemeClr val="accent1"/>
+          </a:effectRef>
+          <a:fontRef idx="minor">
+            <a:schemeClr val="tx1"/>
+          </a:fontRef>
+        </p:style>
+      </p:cxnSp>
+      <p:sp>
+        <p:nvSpPr>
+          <p:cNvPr id="146" name="TextBox 145"/>
+          <p:cNvSpPr txBox="1"/>
+          <p:nvPr/>
+        </p:nvSpPr>
+        <p:spPr>
+          <a:xfrm>
+            <a:off x="3943852" y="4887110"/>
+            <a:ext cx="795835" cy="400110"/>
+          </a:xfrm>
+          <a:prstGeom prst="rect">
+            <a:avLst/>
+          </a:prstGeom>
+          <a:noFill/>
+          <a:effectLst>
+            <a:glow rad="304800">
+              <a:schemeClr val="bg1"/>
+            </a:glow>
+          </a:effectLst>
+        </p:spPr>
+        <p:txBody>
+          <a:bodyPr wrap="square" rtlCol="0">
+            <a:spAutoFit/>
+          </a:bodyPr>
+          <a:lstStyle/>
+          <a:p>
+            <a:pPr algn="r"/>
+            <a:r>
+              <a:rPr lang="en-US" sz="1000" dirty="0" smtClean="0">
+                <a:effectLst>
+                  <a:glow rad="76200">
+                    <a:schemeClr val="bg1">
+                      <a:alpha val="90000"/>
+                    </a:schemeClr>
+                  </a:glow>
+                </a:effectLst>
+              </a:rPr>
+              <a:t>Browser</a:t>
+            </a:r>
+          </a:p>
+          <a:p>
+            <a:pPr algn="r"/>
+            <a:r>
+              <a:rPr lang="en-US" sz="1000" dirty="0" smtClean="0">
+                <a:effectLst>
+                  <a:glow rad="76200">
+                    <a:schemeClr val="bg1">
+                      <a:alpha val="90000"/>
+                    </a:schemeClr>
+                  </a:glow>
+                </a:effectLst>
+              </a:rPr>
+              <a:t>info</a:t>
+            </a:r>
+          </a:p>
+        </p:txBody>
+      </p:sp>
+      <p:sp>
+        <p:nvSpPr>
+          <p:cNvPr id="149" name="TextBox 148"/>
+          <p:cNvSpPr txBox="1"/>
+          <p:nvPr/>
+        </p:nvSpPr>
+        <p:spPr>
+          <a:xfrm>
+            <a:off x="1195624" y="5276320"/>
+            <a:ext cx="795835" cy="400110"/>
+          </a:xfrm>
+          <a:prstGeom prst="rect">
+            <a:avLst/>
+          </a:prstGeom>
+          <a:noFill/>
+          <a:effectLst>
+            <a:glow rad="304800">
+              <a:schemeClr val="bg1"/>
+            </a:glow>
+          </a:effectLst>
+        </p:spPr>
+        <p:txBody>
+          <a:bodyPr wrap="square" rtlCol="0">
+            <a:spAutoFit/>
+          </a:bodyPr>
+          <a:lstStyle/>
+          <a:p>
+            <a:r>
+              <a:rPr lang="en-US" sz="1000" dirty="0" smtClean="0">
+                <a:effectLst>
+                  <a:glow rad="76200">
+                    <a:schemeClr val="bg1">
+                      <a:alpha val="90000"/>
+                    </a:schemeClr>
+                  </a:glow>
+                </a:effectLst>
+              </a:rPr>
+              <a:t>Unique user ID</a:t>
+            </a:r>
+          </a:p>
+        </p:txBody>
+      </p:sp>
+      <p:cxnSp>
+        <p:nvCxnSpPr>
+          <p:cNvPr id="155" name="Straight Arrow Connector 154"/>
+          <p:cNvCxnSpPr/>
+          <p:nvPr/>
+        </p:nvCxnSpPr>
+        <p:spPr>
+          <a:xfrm flipH="1" flipV="1">
+            <a:off x="1526221" y="4690416"/>
+            <a:ext cx="787948" cy="3536"/>
+          </a:xfrm>
+          <a:prstGeom prst="straightConnector1">
+            <a:avLst/>
+          </a:prstGeom>
+          <a:ln w="38100">
+            <a:solidFill>
+              <a:schemeClr val="accent1"/>
+            </a:solidFill>
+            <a:headEnd type="triangle" w="med" len="med"/>
+            <a:tailEnd type="triangle" w="med" len="med"/>
+          </a:ln>
+        </p:spPr>
+        <p:style>
+          <a:lnRef idx="1">
+            <a:schemeClr val="accent1"/>
+          </a:lnRef>
+          <a:fillRef idx="0">
+            <a:schemeClr val="accent1"/>
+          </a:fillRef>
+          <a:effectRef idx="0">
+            <a:schemeClr val="accent1"/>
+          </a:effectRef>
+          <a:fontRef idx="minor">
+            <a:schemeClr val="tx1"/>
+          </a:fontRef>
+        </p:style>
+      </p:cxnSp>
+      <p:pic>
+        <p:nvPicPr>
+          <p:cNvPr id="166" name="Picture 165"/>
+          <p:cNvPicPr>
+            <a:picLocks noChangeAspect="1"/>
+          </p:cNvPicPr>
+          <p:nvPr/>
+        </p:nvPicPr>
+        <p:blipFill>
+          <a:blip r:embed="rId12">
+            <a:extLst>
+              <a:ext uri="{28A0092B-C50C-407E-A947-70E740481C1C}">
+                <a14:useLocalDpi xmlns:a14="http://schemas.microsoft.com/office/drawing/2010/main" val="0"/>
+              </a:ext>
+            </a:extLst>
+          </a:blip>
+          <a:stretch>
+            <a:fillRect/>
+          </a:stretch>
+        </p:blipFill>
+        <p:spPr>
+          <a:xfrm>
+            <a:off x="8404757" y="4189806"/>
+            <a:ext cx="769853" cy="833643"/>
+          </a:xfrm>
+          <a:prstGeom prst="rect">
+            <a:avLst/>
+          </a:prstGeom>
+        </p:spPr>
+      </p:pic>
+      <p:sp>
+        <p:nvSpPr>
+          <p:cNvPr id="168" name="TextBox 167"/>
+          <p:cNvSpPr txBox="1"/>
+          <p:nvPr/>
+        </p:nvSpPr>
+        <p:spPr>
+          <a:xfrm>
+            <a:off x="8387966" y="4998692"/>
+            <a:ext cx="803434" cy="154042"/>
+          </a:xfrm>
+          <a:prstGeom prst="rect">
+            <a:avLst/>
+          </a:prstGeom>
+          <a:noFill/>
+        </p:spPr>
+        <p:txBody>
+          <a:bodyPr wrap="square" lIns="0" tIns="0" rIns="0" bIns="0" rtlCol="0" anchor="t">
+            <a:noAutofit/>
+          </a:bodyPr>
+          <a:lstStyle/>
+          <a:p>
+            <a:pPr algn="ctr"/>
+            <a:r>
+              <a:rPr lang="en-US" sz="1050" b="1" dirty="0" err="1" smtClean="0"/>
+              <a:t>ProcessVotes</a:t>
+            </a:r>
+            <a:endParaRPr lang="en-US" sz="1050" b="1" dirty="0"/>
+          </a:p>
+        </p:txBody>
+      </p:sp>
+      <p:sp>
+        <p:nvSpPr>
+          <p:cNvPr id="173" name="TextBox 172"/>
+          <p:cNvSpPr txBox="1"/>
+          <p:nvPr/>
+        </p:nvSpPr>
+        <p:spPr>
+          <a:xfrm>
+            <a:off x="3035446" y="4100587"/>
+            <a:ext cx="1150054" cy="400110"/>
+          </a:xfrm>
+          <a:prstGeom prst="rect">
+            <a:avLst/>
+          </a:prstGeom>
+          <a:noFill/>
+          <a:effectLst>
+            <a:glow rad="304800">
+              <a:schemeClr val="bg1"/>
+            </a:glow>
+          </a:effectLst>
+        </p:spPr>
+        <p:txBody>
+          <a:bodyPr wrap="square" rtlCol="0">
+            <a:spAutoFit/>
+          </a:bodyPr>
+          <a:lstStyle/>
+          <a:p>
+            <a:r>
+              <a:rPr lang="en-US" sz="1000" dirty="0" smtClean="0">
+                <a:effectLst>
+                  <a:glow rad="76200">
+                    <a:schemeClr val="bg1">
+                      <a:alpha val="90000"/>
+                    </a:schemeClr>
+                  </a:glow>
+                </a:effectLst>
+              </a:rPr>
+              <a:t>Static webpage &amp;</a:t>
+            </a:r>
+          </a:p>
+          <a:p>
+            <a:r>
+              <a:rPr lang="en-US" sz="1000" dirty="0" smtClean="0">
+                <a:effectLst>
+                  <a:glow rad="76200">
+                    <a:schemeClr val="bg1">
+                      <a:alpha val="90000"/>
+                    </a:schemeClr>
+                  </a:glow>
+                </a:effectLst>
+              </a:rPr>
+              <a:t>embedded video </a:t>
+            </a:r>
+          </a:p>
+        </p:txBody>
+      </p:sp>
+      <p:sp>
+        <p:nvSpPr>
+          <p:cNvPr id="177" name="TextBox 176"/>
+          <p:cNvSpPr txBox="1"/>
+          <p:nvPr/>
+        </p:nvSpPr>
+        <p:spPr>
+          <a:xfrm rot="2174975">
+            <a:off x="7070809" y="5074225"/>
+            <a:ext cx="795835" cy="400110"/>
+          </a:xfrm>
+          <a:prstGeom prst="rect">
+            <a:avLst/>
+          </a:prstGeom>
+          <a:noFill/>
+          <a:effectLst>
+            <a:glow rad="304800">
+              <a:schemeClr val="bg1"/>
+            </a:glow>
+          </a:effectLst>
+        </p:spPr>
+        <p:txBody>
+          <a:bodyPr wrap="square" rtlCol="0">
+            <a:spAutoFit/>
+          </a:bodyPr>
+          <a:lstStyle/>
+          <a:p>
+            <a:r>
+              <a:rPr lang="en-US" sz="1000" dirty="0" smtClean="0">
+                <a:effectLst>
+                  <a:glow rad="76200">
+                    <a:schemeClr val="bg1">
+                      <a:alpha val="90000"/>
+                    </a:schemeClr>
+                  </a:glow>
+                </a:effectLst>
+              </a:rPr>
+              <a:t>Optimal</a:t>
+            </a:r>
+          </a:p>
+          <a:p>
+            <a:r>
+              <a:rPr lang="en-US" sz="1000" dirty="0" smtClean="0">
+                <a:effectLst>
+                  <a:glow rad="76200">
+                    <a:schemeClr val="bg1">
+                      <a:alpha val="90000"/>
+                    </a:schemeClr>
+                  </a:glow>
+                </a:effectLst>
+              </a:rPr>
+              <a:t>VOD List</a:t>
+            </a:r>
+          </a:p>
+        </p:txBody>
+      </p:sp>
+      <p:cxnSp>
+        <p:nvCxnSpPr>
+          <p:cNvPr id="180" name="Straight Arrow Connector 179"/>
+          <p:cNvCxnSpPr>
+            <a:stCxn id="166" idx="1"/>
+          </p:cNvCxnSpPr>
+          <p:nvPr/>
+        </p:nvCxnSpPr>
+        <p:spPr>
+          <a:xfrm flipH="1" flipV="1">
+            <a:off x="6906628" y="4606627"/>
+            <a:ext cx="1498129" cy="1"/>
+          </a:xfrm>
+          <a:prstGeom prst="straightConnector1">
+            <a:avLst/>
+          </a:prstGeom>
+          <a:ln w="38100">
+            <a:tailEnd type="triangle"/>
+          </a:ln>
+        </p:spPr>
+        <p:style>
+          <a:lnRef idx="1">
+            <a:schemeClr val="accent1"/>
+          </a:lnRef>
+          <a:fillRef idx="0">
+            <a:schemeClr val="accent1"/>
+          </a:fillRef>
+          <a:effectRef idx="0">
+            <a:schemeClr val="accent1"/>
+          </a:effectRef>
+          <a:fontRef idx="minor">
+            <a:schemeClr val="tx1"/>
+          </a:fontRef>
+        </p:style>
+      </p:cxnSp>
+      <p:cxnSp>
+        <p:nvCxnSpPr>
+          <p:cNvPr id="185" name="Straight Arrow Connector 184"/>
+          <p:cNvCxnSpPr/>
+          <p:nvPr/>
+        </p:nvCxnSpPr>
+        <p:spPr>
+          <a:xfrm flipH="1">
+            <a:off x="3073720" y="4666252"/>
+            <a:ext cx="1651454" cy="65"/>
+          </a:xfrm>
+          <a:prstGeom prst="straightConnector1">
+            <a:avLst/>
+          </a:prstGeom>
+          <a:ln w="38100">
+            <a:headEnd type="triangle" w="med" len="med"/>
+            <a:tailEnd type="triangle" w="med" len="med"/>
+          </a:ln>
+        </p:spPr>
+        <p:style>
+          <a:lnRef idx="1">
+            <a:schemeClr val="accent1"/>
+          </a:lnRef>
+          <a:fillRef idx="0">
+            <a:schemeClr val="accent1"/>
+          </a:fillRef>
+          <a:effectRef idx="0">
+            <a:schemeClr val="accent1"/>
+          </a:effectRef>
+          <a:fontRef idx="minor">
+            <a:schemeClr val="tx1"/>
+          </a:fontRef>
+        </p:style>
+      </p:cxnSp>
+      <p:sp>
+        <p:nvSpPr>
+          <p:cNvPr id="186" name="TextBox 185"/>
+          <p:cNvSpPr txBox="1"/>
+          <p:nvPr/>
+        </p:nvSpPr>
+        <p:spPr>
+          <a:xfrm>
+            <a:off x="3929339" y="4466197"/>
+            <a:ext cx="795835" cy="400110"/>
+          </a:xfrm>
+          <a:prstGeom prst="rect">
+            <a:avLst/>
+          </a:prstGeom>
+          <a:noFill/>
+          <a:effectLst>
+            <a:glow rad="304800">
+              <a:schemeClr val="bg1"/>
+            </a:glow>
+          </a:effectLst>
+        </p:spPr>
+        <p:txBody>
+          <a:bodyPr wrap="square" rtlCol="0">
+            <a:spAutoFit/>
+          </a:bodyPr>
+          <a:lstStyle/>
+          <a:p>
+            <a:pPr algn="r"/>
+            <a:r>
+              <a:rPr lang="en-US" sz="1000" dirty="0" smtClean="0">
+                <a:effectLst>
+                  <a:glow rad="76200">
+                    <a:schemeClr val="bg1">
+                      <a:alpha val="90000"/>
+                    </a:schemeClr>
+                  </a:glow>
+                </a:effectLst>
+              </a:rPr>
+              <a:t>Cast</a:t>
+            </a:r>
+          </a:p>
+          <a:p>
+            <a:pPr algn="r"/>
+            <a:r>
+              <a:rPr lang="en-US" sz="1000" dirty="0" smtClean="0">
+                <a:effectLst>
+                  <a:glow rad="76200">
+                    <a:schemeClr val="bg1">
+                      <a:alpha val="90000"/>
+                    </a:schemeClr>
+                  </a:glow>
+                </a:effectLst>
+              </a:rPr>
+              <a:t>vote</a:t>
+            </a:r>
+          </a:p>
+        </p:txBody>
+      </p:sp>
+      <p:sp>
+        <p:nvSpPr>
+          <p:cNvPr id="187" name="TextBox 186"/>
+          <p:cNvSpPr txBox="1"/>
+          <p:nvPr/>
+        </p:nvSpPr>
+        <p:spPr>
+          <a:xfrm>
+            <a:off x="3100727" y="4466197"/>
+            <a:ext cx="795835" cy="400110"/>
+          </a:xfrm>
+          <a:prstGeom prst="rect">
+            <a:avLst/>
+          </a:prstGeom>
+          <a:noFill/>
+          <a:effectLst>
+            <a:glow rad="304800">
+              <a:schemeClr val="bg1"/>
+            </a:glow>
+          </a:effectLst>
+        </p:spPr>
+        <p:txBody>
+          <a:bodyPr wrap="square" rtlCol="0">
+            <a:spAutoFit/>
+          </a:bodyPr>
+          <a:lstStyle/>
+          <a:p>
+            <a:r>
+              <a:rPr lang="en-US" sz="1000" dirty="0" smtClean="0">
+                <a:effectLst>
+                  <a:glow rad="76200">
+                    <a:schemeClr val="bg1">
+                      <a:alpha val="90000"/>
+                    </a:schemeClr>
+                  </a:glow>
+                </a:effectLst>
+              </a:rPr>
+              <a:t>Live vote</a:t>
+            </a:r>
+          </a:p>
+          <a:p>
+            <a:r>
+              <a:rPr lang="en-US" sz="1000" dirty="0" smtClean="0">
+                <a:effectLst>
+                  <a:glow rad="76200">
+                    <a:schemeClr val="bg1">
+                      <a:alpha val="90000"/>
+                    </a:schemeClr>
+                  </a:glow>
+                </a:effectLst>
+              </a:rPr>
+              <a:t>Results</a:t>
+            </a:r>
+          </a:p>
+        </p:txBody>
+      </p:sp>
+      <p:cxnSp>
+        <p:nvCxnSpPr>
+          <p:cNvPr id="193" name="Straight Arrow Connector 192"/>
+          <p:cNvCxnSpPr>
+            <a:endCxn id="166" idx="3"/>
+          </p:cNvCxnSpPr>
+          <p:nvPr/>
+        </p:nvCxnSpPr>
+        <p:spPr>
+          <a:xfrm flipH="1" flipV="1">
+            <a:off x="9174610" y="4606628"/>
+            <a:ext cx="1947805" cy="334360"/>
+          </a:xfrm>
+          <a:prstGeom prst="straightConnector1">
+            <a:avLst/>
+          </a:prstGeom>
+          <a:ln w="38100">
+            <a:headEnd type="triangle" w="med" len="med"/>
+            <a:tailEnd type="triangle" w="med" len="med"/>
+          </a:ln>
+        </p:spPr>
+        <p:style>
+          <a:lnRef idx="1">
+            <a:schemeClr val="accent1"/>
+          </a:lnRef>
+          <a:fillRef idx="0">
+            <a:schemeClr val="accent1"/>
+          </a:fillRef>
+          <a:effectRef idx="0">
+            <a:schemeClr val="accent1"/>
+          </a:effectRef>
+          <a:fontRef idx="minor">
+            <a:schemeClr val="tx1"/>
+          </a:fontRef>
+        </p:style>
+      </p:cxnSp>
+      <p:sp>
+        <p:nvSpPr>
+          <p:cNvPr id="196" name="TextBox 195"/>
+          <p:cNvSpPr txBox="1"/>
+          <p:nvPr/>
+        </p:nvSpPr>
+        <p:spPr>
+          <a:xfrm rot="538168">
+            <a:off x="10304270" y="4545733"/>
+            <a:ext cx="590226" cy="400110"/>
+          </a:xfrm>
+          <a:prstGeom prst="rect">
+            <a:avLst/>
+          </a:prstGeom>
+          <a:noFill/>
+          <a:effectLst>
+            <a:glow rad="304800">
+              <a:schemeClr val="bg1"/>
+            </a:glow>
+          </a:effectLst>
+        </p:spPr>
+        <p:txBody>
+          <a:bodyPr wrap="none" rtlCol="0">
+            <a:spAutoFit/>
+          </a:bodyPr>
+          <a:lstStyle/>
+          <a:p>
+            <a:pPr algn="ctr"/>
+            <a:r>
+              <a:rPr lang="en-US" sz="1000" dirty="0" smtClean="0">
+                <a:effectLst>
+                  <a:glow rad="76200">
+                    <a:schemeClr val="bg1">
+                      <a:alpha val="90000"/>
+                    </a:schemeClr>
+                  </a:glow>
+                </a:effectLst>
+              </a:rPr>
+              <a:t>Unique </a:t>
+            </a:r>
+          </a:p>
+          <a:p>
+            <a:pPr algn="ctr"/>
+            <a:r>
+              <a:rPr lang="en-US" sz="1000" dirty="0" smtClean="0">
+                <a:effectLst>
+                  <a:glow rad="76200">
+                    <a:schemeClr val="bg1">
+                      <a:alpha val="90000"/>
+                    </a:schemeClr>
+                  </a:glow>
+                </a:effectLst>
+              </a:rPr>
+              <a:t>Votes</a:t>
+            </a:r>
+          </a:p>
+        </p:txBody>
+      </p:sp>
+      <p:sp>
+        <p:nvSpPr>
+          <p:cNvPr id="202" name="TextBox 201"/>
+          <p:cNvSpPr txBox="1"/>
+          <p:nvPr/>
+        </p:nvSpPr>
+        <p:spPr>
+          <a:xfrm>
+            <a:off x="3122477" y="4887110"/>
+            <a:ext cx="795835" cy="400110"/>
+          </a:xfrm>
+          <a:prstGeom prst="rect">
+            <a:avLst/>
+          </a:prstGeom>
+          <a:noFill/>
+          <a:effectLst>
+            <a:glow rad="304800">
+              <a:schemeClr val="bg1"/>
+            </a:glow>
+          </a:effectLst>
+        </p:spPr>
+        <p:txBody>
+          <a:bodyPr wrap="square" rtlCol="0">
+            <a:spAutoFit/>
+          </a:bodyPr>
+          <a:lstStyle/>
+          <a:p>
+            <a:r>
+              <a:rPr lang="en-US" sz="1000" dirty="0" smtClean="0">
+                <a:effectLst>
+                  <a:glow rad="76200">
+                    <a:schemeClr val="bg1">
+                      <a:alpha val="90000"/>
+                    </a:schemeClr>
+                  </a:glow>
+                </a:effectLst>
+              </a:rPr>
+              <a:t>Optimal</a:t>
+            </a:r>
+          </a:p>
+          <a:p>
+            <a:r>
+              <a:rPr lang="en-US" sz="1000" dirty="0" smtClean="0">
+                <a:effectLst>
+                  <a:glow rad="76200">
+                    <a:schemeClr val="bg1">
+                      <a:alpha val="90000"/>
+                    </a:schemeClr>
+                  </a:glow>
+                </a:effectLst>
+              </a:rPr>
+              <a:t>VOD list</a:t>
+            </a:r>
+          </a:p>
+        </p:txBody>
+      </p:sp>
+      <p:sp>
+        <p:nvSpPr>
+          <p:cNvPr id="204" name="TextBox 203"/>
+          <p:cNvSpPr txBox="1"/>
+          <p:nvPr/>
+        </p:nvSpPr>
+        <p:spPr>
+          <a:xfrm>
+            <a:off x="7678794" y="4447013"/>
+            <a:ext cx="795835" cy="400110"/>
+          </a:xfrm>
+          <a:prstGeom prst="rect">
+            <a:avLst/>
+          </a:prstGeom>
+          <a:noFill/>
+          <a:effectLst>
+            <a:glow rad="304800">
+              <a:schemeClr val="bg1"/>
+            </a:glow>
+          </a:effectLst>
+        </p:spPr>
+        <p:txBody>
+          <a:bodyPr wrap="square" rtlCol="0">
+            <a:spAutoFit/>
+          </a:bodyPr>
+          <a:lstStyle/>
+          <a:p>
+            <a:pPr algn="r"/>
+            <a:r>
+              <a:rPr lang="en-US" sz="1000" dirty="0" smtClean="0">
+                <a:effectLst>
+                  <a:glow rad="76200">
+                    <a:schemeClr val="bg1">
+                      <a:alpha val="90000"/>
+                    </a:schemeClr>
+                  </a:glow>
+                </a:effectLst>
+              </a:rPr>
+              <a:t>Unique</a:t>
+            </a:r>
+          </a:p>
+          <a:p>
+            <a:pPr algn="r"/>
+            <a:r>
+              <a:rPr lang="en-US" sz="1000" dirty="0" smtClean="0">
+                <a:effectLst>
+                  <a:glow rad="76200">
+                    <a:schemeClr val="bg1">
+                      <a:alpha val="90000"/>
+                    </a:schemeClr>
+                  </a:glow>
+                </a:effectLst>
+              </a:rPr>
+              <a:t>Vote</a:t>
+            </a:r>
+          </a:p>
+        </p:txBody>
+      </p:sp>
+      <p:sp>
+        <p:nvSpPr>
+          <p:cNvPr id="205" name="TextBox 204"/>
+          <p:cNvSpPr txBox="1"/>
+          <p:nvPr/>
+        </p:nvSpPr>
+        <p:spPr>
+          <a:xfrm>
+            <a:off x="7116732" y="4420975"/>
+            <a:ext cx="795835" cy="400110"/>
+          </a:xfrm>
+          <a:prstGeom prst="rect">
+            <a:avLst/>
+          </a:prstGeom>
+          <a:noFill/>
+          <a:effectLst>
+            <a:glow rad="304800">
+              <a:schemeClr val="bg1"/>
+            </a:glow>
+          </a:effectLst>
+        </p:spPr>
+        <p:txBody>
+          <a:bodyPr wrap="square" rtlCol="0">
+            <a:spAutoFit/>
+          </a:bodyPr>
+          <a:lstStyle/>
+          <a:p>
+            <a:r>
+              <a:rPr lang="en-US" sz="1000" dirty="0" smtClean="0">
+                <a:effectLst>
+                  <a:glow rad="76200">
+                    <a:schemeClr val="bg1">
+                      <a:alpha val="90000"/>
+                    </a:schemeClr>
+                  </a:glow>
+                </a:effectLst>
+              </a:rPr>
+              <a:t>Live vote results</a:t>
+            </a:r>
+          </a:p>
+        </p:txBody>
+      </p:sp>
+      <p:sp>
+        <p:nvSpPr>
+          <p:cNvPr id="212" name="TextBox 211"/>
+          <p:cNvSpPr txBox="1"/>
+          <p:nvPr/>
+        </p:nvSpPr>
+        <p:spPr>
+          <a:xfrm rot="2146497">
+            <a:off x="7644900" y="5555862"/>
+            <a:ext cx="795835" cy="400110"/>
+          </a:xfrm>
+          <a:prstGeom prst="rect">
+            <a:avLst/>
+          </a:prstGeom>
+          <a:noFill/>
+          <a:effectLst>
+            <a:glow rad="304800">
+              <a:schemeClr val="bg1"/>
+            </a:glow>
+          </a:effectLst>
+        </p:spPr>
+        <p:txBody>
+          <a:bodyPr wrap="square" rtlCol="0">
+            <a:spAutoFit/>
+          </a:bodyPr>
+          <a:lstStyle/>
+          <a:p>
+            <a:pPr algn="r"/>
+            <a:r>
+              <a:rPr lang="en-US" sz="1000" dirty="0" smtClean="0">
+                <a:effectLst>
+                  <a:glow rad="76200">
+                    <a:schemeClr val="bg1">
+                      <a:alpha val="90000"/>
+                    </a:schemeClr>
+                  </a:glow>
+                </a:effectLst>
+              </a:rPr>
+              <a:t>Browser</a:t>
+            </a:r>
+            <a:endParaRPr lang="en-US" sz="1000" dirty="0">
+              <a:effectLst>
+                <a:glow rad="76200">
+                  <a:schemeClr val="bg1">
+                    <a:alpha val="90000"/>
+                  </a:schemeClr>
+                </a:glow>
+              </a:effectLst>
+            </a:endParaRPr>
+          </a:p>
+          <a:p>
+            <a:pPr algn="r"/>
+            <a:r>
+              <a:rPr lang="en-US" sz="1000" dirty="0" smtClean="0">
+                <a:effectLst>
+                  <a:glow rad="76200">
+                    <a:schemeClr val="bg1">
+                      <a:alpha val="90000"/>
+                    </a:schemeClr>
+                  </a:glow>
+                </a:effectLst>
+              </a:rPr>
+              <a:t>info</a:t>
+            </a:r>
+            <a:endParaRPr lang="en-US" sz="1000" dirty="0">
+              <a:effectLst>
+                <a:glow rad="76200">
+                  <a:schemeClr val="bg1">
+                    <a:alpha val="90000"/>
+                  </a:schemeClr>
+                </a:glow>
+              </a:effectLst>
+            </a:endParaRPr>
+          </a:p>
+        </p:txBody>
+      </p:sp>
+      <p:sp>
+        <p:nvSpPr>
+          <p:cNvPr id="214" name="TextBox 213"/>
+          <p:cNvSpPr txBox="1"/>
+          <p:nvPr/>
+        </p:nvSpPr>
+        <p:spPr>
+          <a:xfrm>
+            <a:off x="3833295" y="1541000"/>
+            <a:ext cx="872354" cy="400110"/>
+          </a:xfrm>
+          <a:prstGeom prst="rect">
+            <a:avLst/>
+          </a:prstGeom>
+          <a:noFill/>
+          <a:effectLst>
+            <a:glow rad="304800">
+              <a:schemeClr val="bg1"/>
+            </a:glow>
+          </a:effectLst>
+        </p:spPr>
+        <p:txBody>
+          <a:bodyPr wrap="none" rtlCol="0">
+            <a:spAutoFit/>
+          </a:bodyPr>
+          <a:lstStyle/>
+          <a:p>
+            <a:pPr algn="r"/>
+            <a:r>
+              <a:rPr lang="en-US" sz="1000" dirty="0" smtClean="0">
+                <a:effectLst>
+                  <a:glow rad="76200">
+                    <a:schemeClr val="bg1">
+                      <a:alpha val="90000"/>
+                    </a:schemeClr>
+                  </a:glow>
+                </a:effectLst>
+              </a:rPr>
+              <a:t>Upload </a:t>
+            </a:r>
+          </a:p>
+          <a:p>
+            <a:pPr algn="r"/>
+            <a:r>
+              <a:rPr lang="en-US" sz="1000" dirty="0" smtClean="0">
+                <a:effectLst>
+                  <a:glow rad="76200">
+                    <a:schemeClr val="bg1">
+                      <a:alpha val="90000"/>
+                    </a:schemeClr>
+                  </a:glow>
+                </a:effectLst>
+              </a:rPr>
+              <a:t>replay videos</a:t>
+            </a:r>
+          </a:p>
+        </p:txBody>
+      </p:sp>
+      <p:pic>
+        <p:nvPicPr>
+          <p:cNvPr id="216" name="Picture 215"/>
+          <p:cNvPicPr>
+            <a:picLocks noChangeAspect="1"/>
+          </p:cNvPicPr>
+          <p:nvPr/>
+        </p:nvPicPr>
+        <p:blipFill>
+          <a:blip r:embed="rId17">
+            <a:extLst>
+              <a:ext uri="{28A0092B-C50C-407E-A947-70E740481C1C}">
+                <a14:useLocalDpi xmlns:a14="http://schemas.microsoft.com/office/drawing/2010/main" val="0"/>
+              </a:ext>
+            </a:extLst>
+          </a:blip>
+          <a:stretch>
+            <a:fillRect/>
+          </a:stretch>
+        </p:blipFill>
+        <p:spPr>
+          <a:xfrm>
+            <a:off x="2460499" y="2540907"/>
+            <a:ext cx="537317" cy="638065"/>
+          </a:xfrm>
+          <a:prstGeom prst="rect">
+            <a:avLst/>
+          </a:prstGeom>
+        </p:spPr>
+      </p:pic>
+      <p:sp>
+        <p:nvSpPr>
+          <p:cNvPr id="217" name="TextBox 216"/>
+          <p:cNvSpPr txBox="1"/>
+          <p:nvPr/>
+        </p:nvSpPr>
+        <p:spPr>
+          <a:xfrm>
+            <a:off x="2363398" y="3217988"/>
+            <a:ext cx="731520" cy="155632"/>
+          </a:xfrm>
+          <a:prstGeom prst="rect">
+            <a:avLst/>
+          </a:prstGeom>
+          <a:noFill/>
+        </p:spPr>
+        <p:txBody>
+          <a:bodyPr wrap="square" lIns="0" tIns="0" rIns="0" bIns="0" rtlCol="0" anchor="t">
+            <a:noAutofit/>
+          </a:bodyPr>
+          <a:lstStyle/>
+          <a:p>
+            <a:pPr algn="ctr"/>
+            <a:r>
+              <a:rPr lang="en-US" sz="1000" b="1" dirty="0"/>
+              <a:t>Amazon</a:t>
+            </a:r>
+            <a:br>
+              <a:rPr lang="en-US" sz="1000" b="1" dirty="0"/>
+            </a:br>
+            <a:r>
+              <a:rPr lang="en-US" sz="1000" b="1" dirty="0"/>
+              <a:t>Route 53</a:t>
+            </a:r>
+          </a:p>
+        </p:txBody>
+      </p:sp>
+      <p:cxnSp>
+        <p:nvCxnSpPr>
+          <p:cNvPr id="218" name="Straight Arrow Connector 217"/>
+          <p:cNvCxnSpPr/>
+          <p:nvPr/>
+        </p:nvCxnSpPr>
+        <p:spPr>
+          <a:xfrm flipH="1">
+            <a:off x="1514923" y="3084294"/>
+            <a:ext cx="1078382" cy="1055130"/>
+          </a:xfrm>
+          <a:prstGeom prst="straightConnector1">
+            <a:avLst/>
+          </a:prstGeom>
+          <a:ln w="38100">
+            <a:solidFill>
+              <a:schemeClr val="accent1"/>
+            </a:solidFill>
+            <a:headEnd type="triangle" w="med" len="med"/>
+            <a:tailEnd type="triangle" w="med" len="med"/>
+          </a:ln>
+        </p:spPr>
+        <p:style>
+          <a:lnRef idx="1">
+            <a:schemeClr val="accent1"/>
+          </a:lnRef>
+          <a:fillRef idx="0">
+            <a:schemeClr val="accent1"/>
+          </a:fillRef>
+          <a:effectRef idx="0">
+            <a:schemeClr val="accent1"/>
+          </a:effectRef>
+          <a:fontRef idx="minor">
+            <a:schemeClr val="tx1"/>
+          </a:fontRef>
+        </p:style>
+      </p:cxnSp>
+      <p:sp>
+        <p:nvSpPr>
+          <p:cNvPr id="227" name="TextBox 226"/>
+          <p:cNvSpPr txBox="1"/>
+          <p:nvPr/>
+        </p:nvSpPr>
+        <p:spPr>
+          <a:xfrm rot="21021559">
+            <a:off x="9184245" y="5706591"/>
+            <a:ext cx="790666" cy="400110"/>
+          </a:xfrm>
+          <a:prstGeom prst="rect">
+            <a:avLst/>
+          </a:prstGeom>
+          <a:noFill/>
+          <a:effectLst>
+            <a:glow rad="304800">
+              <a:schemeClr val="bg1"/>
+            </a:glow>
+          </a:effectLst>
+        </p:spPr>
+        <p:txBody>
+          <a:bodyPr wrap="none" rtlCol="0">
+            <a:spAutoFit/>
+          </a:bodyPr>
+          <a:lstStyle/>
+          <a:p>
+            <a:r>
+              <a:rPr lang="en-US" sz="1000" dirty="0" smtClean="0">
+                <a:effectLst>
+                  <a:glow rad="76200">
+                    <a:schemeClr val="bg1">
+                      <a:alpha val="90000"/>
+                    </a:schemeClr>
+                  </a:glow>
+                </a:effectLst>
+              </a:rPr>
+              <a:t>Transcoded</a:t>
+            </a:r>
+          </a:p>
+          <a:p>
+            <a:r>
+              <a:rPr lang="en-US" sz="1000" dirty="0" smtClean="0">
+                <a:effectLst>
+                  <a:glow rad="76200">
+                    <a:schemeClr val="bg1">
+                      <a:alpha val="90000"/>
+                    </a:schemeClr>
+                  </a:glow>
+                </a:effectLst>
+              </a:rPr>
+              <a:t>Video info</a:t>
+            </a:r>
+          </a:p>
+        </p:txBody>
+      </p:sp>
+      <p:cxnSp>
+        <p:nvCxnSpPr>
+          <p:cNvPr id="236" name="Straight Arrow Connector 129"/>
+          <p:cNvCxnSpPr/>
+          <p:nvPr/>
+        </p:nvCxnSpPr>
+        <p:spPr>
+          <a:xfrm rot="10800000" flipV="1">
+            <a:off x="5616308" y="5079733"/>
+            <a:ext cx="665613" cy="2927"/>
+          </a:xfrm>
+          <a:prstGeom prst="bentConnector3">
+            <a:avLst>
+              <a:gd name="adj1" fmla="val 50000"/>
+            </a:avLst>
+          </a:prstGeom>
+          <a:ln w="38100">
+            <a:headEnd type="triangle" w="med" len="med"/>
+            <a:tailEnd type="triangle" w="med" len="med"/>
+          </a:ln>
+        </p:spPr>
+        <p:style>
+          <a:lnRef idx="1">
+            <a:schemeClr val="accent1"/>
+          </a:lnRef>
+          <a:fillRef idx="0">
+            <a:schemeClr val="accent1"/>
+          </a:fillRef>
+          <a:effectRef idx="0">
+            <a:schemeClr val="accent1"/>
+          </a:effectRef>
+          <a:fontRef idx="minor">
+            <a:schemeClr val="tx1"/>
+          </a:fontRef>
+        </p:style>
+      </p:cxnSp>
+      <p:cxnSp>
+        <p:nvCxnSpPr>
+          <p:cNvPr id="239" name="Straight Arrow Connector 129"/>
+          <p:cNvCxnSpPr/>
+          <p:nvPr/>
+        </p:nvCxnSpPr>
+        <p:spPr>
+          <a:xfrm rot="10800000" flipV="1">
+            <a:off x="5856646" y="4646725"/>
+            <a:ext cx="477276" cy="3343"/>
+          </a:xfrm>
+          <a:prstGeom prst="bentConnector3">
+            <a:avLst>
+              <a:gd name="adj1" fmla="val 50000"/>
+            </a:avLst>
+          </a:prstGeom>
+          <a:ln w="38100">
+            <a:headEnd type="triangle" w="med" len="med"/>
+            <a:tailEnd type="triangle" w="med" len="med"/>
+          </a:ln>
+        </p:spPr>
+        <p:style>
+          <a:lnRef idx="1">
+            <a:schemeClr val="accent1"/>
+          </a:lnRef>
+          <a:fillRef idx="0">
+            <a:schemeClr val="accent1"/>
+          </a:fillRef>
+          <a:effectRef idx="0">
+            <a:schemeClr val="accent1"/>
+          </a:effectRef>
+          <a:fontRef idx="minor">
+            <a:schemeClr val="tx1"/>
+          </a:fontRef>
+        </p:style>
+      </p:cxnSp>
+    </p:spTree>
+    <p:extLst>
+      <p:ext uri="{BB962C8B-B14F-4D97-AF65-F5344CB8AC3E}">
+        <p14:creationId xmlns:p14="http://schemas.microsoft.com/office/powerpoint/2010/main" val="2006177260"/>
+      </p:ext>
+    </p:extLst>
+  </p:cSld>
+  <p:clrMapOvr>
+    <a:masterClrMapping/>
+  </p:clrMapOvr>
+  <p:timing>
+    <p:tnLst>
+      <p:par>
+        <p:cTn id="1" dur="indefinite" restart="never" nodeType="tmRoot">
+          <p:childTnLst>
+            <p:seq concurrent="1" nextAc="seek">
+              <p:cTn id="2" dur="indefinite" nodeType="mainSeq">
+                <p:childTnLst>
+                  <p:par>
+                    <p:cTn id="3" fill="hold">
+                      <p:stCondLst>
+                        <p:cond delay="indefinite"/>
+                        <p:cond evt="onBegin" delay="0">
+                          <p:tn val="2"/>
+                        </p:cond>
+                      </p:stCondLst>
+                      <p:childTnLst>
+                        <p:par>
+                          <p:cTn id="4" fill="hold">
+                            <p:stCondLst>
+                              <p:cond delay="0"/>
+                            </p:stCondLst>
+                            <p:childTnLst>
+                              <p:par>
+                                <p:cTn id="5" presetID="10" presetClass="entr" presetSubtype="0" fill="hold" nodeType="afterEffect">
+                                  <p:stCondLst>
+                                    <p:cond delay="0"/>
+                                  </p:stCondLst>
+                                  <p:childTnLst>
+                                    <p:set>
+                                      <p:cBhvr>
+                                        <p:cTn id="6" dur="1" fill="hold">
+                                          <p:stCondLst>
+                                            <p:cond delay="0"/>
+                                          </p:stCondLst>
+                                        </p:cTn>
+                                        <p:tgtEl>
+                                          <p:spTgt spid="41"/>
+                                        </p:tgtEl>
+                                        <p:attrNameLst>
+                                          <p:attrName>style.visibility</p:attrName>
+                                        </p:attrNameLst>
+                                      </p:cBhvr>
+                                      <p:to>
+                                        <p:strVal val="visible"/>
+                                      </p:to>
+                                    </p:set>
+                                    <p:animEffect transition="in" filter="fade">
+                                      <p:cBhvr>
+                                        <p:cTn id="7" dur="500"/>
+                                        <p:tgtEl>
+                                          <p:spTgt spid="41"/>
+                                        </p:tgtEl>
+                                      </p:cBhvr>
+                                    </p:animEffect>
+                                  </p:childTnLst>
+                                </p:cTn>
+                              </p:par>
+                            </p:childTnLst>
+                          </p:cTn>
+                        </p:par>
+                      </p:childTnLst>
+                    </p:cTn>
+                  </p:par>
+                </p:childTnLst>
+              </p:cTn>
+              <p:prevCondLst>
+                <p:cond evt="onPrev" delay="0">
+                  <p:tgtEl>
+                    <p:sldTgt/>
+                  </p:tgtEl>
+                </p:cond>
+              </p:prevCondLst>
+              <p:nextCondLst>
+                <p:cond evt="onNext" delay="0">
+                  <p:tgtEl>
+                    <p:sldTgt/>
+                  </p:tgtEl>
+                </p:cond>
+              </p:nextCondLst>
+            </p:seq>
+          </p:childTnLst>
+        </p:cTn>
+      </p:par>
+    </p:tnLst>
+  </p:timing>
+</p:sld>
+</file>
+
+<file path=ppt/slides/slide4.xml><?xml version="1.0" encoding="utf-8"?>
 <p:sld xmlns:a="http://schemas.openxmlformats.org/drawingml/2006/main" xmlns:r="http://schemas.openxmlformats.org/officeDocument/2006/relationships" xmlns:p="http://schemas.openxmlformats.org/presentationml/2006/main">
   <p:cSld>
     <p:spTree>

</xml_diff>